<commit_message>
Final slide deck and code comments for presentation.
</commit_message>
<xml_diff>
--- a/PresentationContent/PyDev_IoT_SlideDeck_Part2.pptx
+++ b/PresentationContent/PyDev_IoT_SlideDeck_Part2.pptx
@@ -12,17 +12,17 @@
     <p:sldId id="268" r:id="rId3"/>
     <p:sldId id="258" r:id="rId4"/>
     <p:sldId id="271" r:id="rId5"/>
-    <p:sldId id="274" r:id="rId6"/>
-    <p:sldId id="272" r:id="rId7"/>
+    <p:sldId id="272" r:id="rId6"/>
+    <p:sldId id="274" r:id="rId7"/>
     <p:sldId id="265" r:id="rId8"/>
     <p:sldId id="279" r:id="rId9"/>
     <p:sldId id="280" r:id="rId10"/>
-    <p:sldId id="278" r:id="rId11"/>
-    <p:sldId id="269" r:id="rId12"/>
-    <p:sldId id="260" r:id="rId13"/>
-    <p:sldId id="275" r:id="rId14"/>
-    <p:sldId id="276" r:id="rId15"/>
-    <p:sldId id="270" r:id="rId16"/>
+    <p:sldId id="269" r:id="rId11"/>
+    <p:sldId id="260" r:id="rId12"/>
+    <p:sldId id="275" r:id="rId13"/>
+    <p:sldId id="276" r:id="rId14"/>
+    <p:sldId id="270" r:id="rId15"/>
+    <p:sldId id="278" r:id="rId16"/>
     <p:sldId id="263" r:id="rId17"/>
     <p:sldId id="264" r:id="rId18"/>
     <p:sldId id="257" r:id="rId19"/>
@@ -215,7 +215,7 @@
           <a:p>
             <a:fld id="{D49E6420-57D5-43F5-B010-7A2248F98912}" type="datetimeFigureOut">
               <a:rPr lang="en-US" smtClean="0"/>
-              <a:t>5/15/2016</a:t>
+              <a:t>5/16/2016</a:t>
             </a:fld>
             <a:endParaRPr lang="en-US"/>
           </a:p>
@@ -527,6 +527,23 @@
           <a:bodyPr/>
           <a:lstStyle/>
           <a:p>
+            <a:pPr marL="0" marR="0" indent="0" algn="l" defTabSz="914400" rtl="0" eaLnBrk="1" fontAlgn="auto" latinLnBrk="0" hangingPunct="1">
+              <a:lnSpc>
+                <a:spcPct val="100000"/>
+              </a:lnSpc>
+              <a:spcBef>
+                <a:spcPts val="0"/>
+              </a:spcBef>
+              <a:spcAft>
+                <a:spcPts val="0"/>
+              </a:spcAft>
+              <a:buClrTx/>
+              <a:buSzTx/>
+              <a:buFontTx/>
+              <a:buNone/>
+              <a:tabLst/>
+              <a:defRPr/>
+            </a:pPr>
             <a:r>
               <a:rPr lang="en-US" sz="1200" b="0" i="0" kern="1200" dirty="0" smtClean="0">
                 <a:solidFill>
@@ -537,10 +554,10 @@
                 <a:ea typeface="+mn-ea"/>
                 <a:cs typeface="+mn-cs"/>
               </a:rPr>
-              <a:t>The </a:t>
-            </a:r>
-            <a:r>
-              <a:rPr lang="en-US" sz="1200" b="1" i="0" kern="1200" dirty="0" smtClean="0">
+              <a:t>Network of physical devices - sensing,</a:t>
+            </a:r>
+            <a:r>
+              <a:rPr lang="en-US" sz="1200" b="0" i="0" kern="1200" baseline="0" dirty="0" smtClean="0">
                 <a:solidFill>
                   <a:schemeClr val="tx1"/>
                 </a:solidFill>
@@ -549,10 +566,29 @@
                 <a:ea typeface="+mn-ea"/>
                 <a:cs typeface="+mn-cs"/>
               </a:rPr>
-              <a:t>Internet of Things</a:t>
-            </a:r>
-            <a:r>
-              <a:rPr lang="en-US" sz="1200" b="0" i="0" kern="1200" dirty="0" smtClean="0">
+              <a:t> recording data, sharing data, interacting with each other and their environments</a:t>
+            </a:r>
+          </a:p>
+          <a:p>
+            <a:pPr marL="0" marR="0" indent="0" algn="l" defTabSz="914400" rtl="0" eaLnBrk="1" fontAlgn="auto" latinLnBrk="0" hangingPunct="1">
+              <a:lnSpc>
+                <a:spcPct val="100000"/>
+              </a:lnSpc>
+              <a:spcBef>
+                <a:spcPts val="0"/>
+              </a:spcBef>
+              <a:spcAft>
+                <a:spcPts val="0"/>
+              </a:spcAft>
+              <a:buClrTx/>
+              <a:buSzTx/>
+              <a:buFontTx/>
+              <a:buNone/>
+              <a:tabLst/>
+              <a:defRPr/>
+            </a:pPr>
+            <a:r>
+              <a:rPr lang="en-US" sz="1200" b="0" i="0" kern="1200" baseline="0" dirty="0" smtClean="0">
                 <a:solidFill>
                   <a:schemeClr val="tx1"/>
                 </a:solidFill>
@@ -561,10 +597,29 @@
                 <a:ea typeface="+mn-ea"/>
                 <a:cs typeface="+mn-cs"/>
               </a:rPr>
-              <a:t> (</a:t>
-            </a:r>
-            <a:r>
-              <a:rPr lang="en-US" sz="1200" b="1" i="0" kern="1200" dirty="0" err="1" smtClean="0">
+              <a:t>Estimates as high as 50 billion objects by 2020</a:t>
+            </a:r>
+          </a:p>
+          <a:p>
+            <a:pPr marL="0" marR="0" indent="0" algn="l" defTabSz="914400" rtl="0" eaLnBrk="1" fontAlgn="auto" latinLnBrk="0" hangingPunct="1">
+              <a:lnSpc>
+                <a:spcPct val="100000"/>
+              </a:lnSpc>
+              <a:spcBef>
+                <a:spcPts val="0"/>
+              </a:spcBef>
+              <a:spcAft>
+                <a:spcPts val="0"/>
+              </a:spcAft>
+              <a:buClrTx/>
+              <a:buSzTx/>
+              <a:buFontTx/>
+              <a:buNone/>
+              <a:tabLst/>
+              <a:defRPr/>
+            </a:pPr>
+            <a:r>
+              <a:rPr lang="en-US" sz="1200" b="0" i="0" kern="1200" baseline="0" dirty="0" smtClean="0">
                 <a:solidFill>
                   <a:schemeClr val="tx1"/>
                 </a:solidFill>
@@ -573,557 +628,7 @@
                 <a:ea typeface="+mn-ea"/>
                 <a:cs typeface="+mn-cs"/>
               </a:rPr>
-              <a:t>IoT</a:t>
-            </a:r>
-            <a:r>
-              <a:rPr lang="en-US" sz="1200" b="0" i="0" kern="1200" dirty="0" smtClean="0">
-                <a:solidFill>
-                  <a:schemeClr val="tx1"/>
-                </a:solidFill>
-                <a:effectLst/>
-                <a:latin typeface="+mn-lt"/>
-                <a:ea typeface="+mn-ea"/>
-                <a:cs typeface="+mn-cs"/>
-              </a:rPr>
-              <a:t>) is the network of physical objects—devices, vehicles, buildings and other items—</a:t>
-            </a:r>
-            <a:r>
-              <a:rPr lang="en-US" sz="1200" b="0" i="0" u="none" strike="noStrike" kern="1200" dirty="0" smtClean="0">
-                <a:solidFill>
-                  <a:schemeClr val="tx1"/>
-                </a:solidFill>
-                <a:effectLst/>
-                <a:latin typeface="+mn-lt"/>
-                <a:ea typeface="+mn-ea"/>
-                <a:cs typeface="+mn-cs"/>
-                <a:hlinkClick r:id="rId3" tooltip="Embedded system"/>
-              </a:rPr>
-              <a:t>embedded</a:t>
-            </a:r>
-            <a:r>
-              <a:rPr lang="en-US" sz="1200" b="0" i="0" kern="1200" dirty="0" smtClean="0">
-                <a:solidFill>
-                  <a:schemeClr val="tx1"/>
-                </a:solidFill>
-                <a:effectLst/>
-                <a:latin typeface="+mn-lt"/>
-                <a:ea typeface="+mn-ea"/>
-                <a:cs typeface="+mn-cs"/>
-              </a:rPr>
-              <a:t> </a:t>
-            </a:r>
-            <a:r>
-              <a:rPr lang="en-US" sz="1200" b="0" i="0" kern="1200" dirty="0" err="1" smtClean="0">
-                <a:solidFill>
-                  <a:schemeClr val="tx1"/>
-                </a:solidFill>
-                <a:effectLst/>
-                <a:latin typeface="+mn-lt"/>
-                <a:ea typeface="+mn-ea"/>
-                <a:cs typeface="+mn-cs"/>
-              </a:rPr>
-              <a:t>with</a:t>
-            </a:r>
-            <a:r>
-              <a:rPr lang="en-US" sz="1200" b="0" i="0" u="none" strike="noStrike" kern="1200" dirty="0" err="1" smtClean="0">
-                <a:solidFill>
-                  <a:schemeClr val="tx1"/>
-                </a:solidFill>
-                <a:effectLst/>
-                <a:latin typeface="+mn-lt"/>
-                <a:ea typeface="+mn-ea"/>
-                <a:cs typeface="+mn-cs"/>
-                <a:hlinkClick r:id="rId4" tooltip="Electronics"/>
-              </a:rPr>
-              <a:t>electronics</a:t>
-            </a:r>
-            <a:r>
-              <a:rPr lang="en-US" sz="1200" b="0" i="0" kern="1200" dirty="0" smtClean="0">
-                <a:solidFill>
-                  <a:schemeClr val="tx1"/>
-                </a:solidFill>
-                <a:effectLst/>
-                <a:latin typeface="+mn-lt"/>
-                <a:ea typeface="+mn-ea"/>
-                <a:cs typeface="+mn-cs"/>
-              </a:rPr>
-              <a:t>, </a:t>
-            </a:r>
-            <a:r>
-              <a:rPr lang="en-US" sz="1200" b="0" i="0" u="none" strike="noStrike" kern="1200" dirty="0" smtClean="0">
-                <a:solidFill>
-                  <a:schemeClr val="tx1"/>
-                </a:solidFill>
-                <a:effectLst/>
-                <a:latin typeface="+mn-lt"/>
-                <a:ea typeface="+mn-ea"/>
-                <a:cs typeface="+mn-cs"/>
-                <a:hlinkClick r:id="rId5" tooltip="Software"/>
-              </a:rPr>
-              <a:t>software</a:t>
-            </a:r>
-            <a:r>
-              <a:rPr lang="en-US" sz="1200" b="0" i="0" kern="1200" dirty="0" smtClean="0">
-                <a:solidFill>
-                  <a:schemeClr val="tx1"/>
-                </a:solidFill>
-                <a:effectLst/>
-                <a:latin typeface="+mn-lt"/>
-                <a:ea typeface="+mn-ea"/>
-                <a:cs typeface="+mn-cs"/>
-              </a:rPr>
-              <a:t>, </a:t>
-            </a:r>
-            <a:r>
-              <a:rPr lang="en-US" sz="1200" b="0" i="0" u="none" strike="noStrike" kern="1200" dirty="0" smtClean="0">
-                <a:solidFill>
-                  <a:schemeClr val="tx1"/>
-                </a:solidFill>
-                <a:effectLst/>
-                <a:latin typeface="+mn-lt"/>
-                <a:ea typeface="+mn-ea"/>
-                <a:cs typeface="+mn-cs"/>
-                <a:hlinkClick r:id="rId6" tooltip="Sensor"/>
-              </a:rPr>
-              <a:t>sensors</a:t>
-            </a:r>
-            <a:r>
-              <a:rPr lang="en-US" sz="1200" b="0" i="0" kern="1200" dirty="0" smtClean="0">
-                <a:solidFill>
-                  <a:schemeClr val="tx1"/>
-                </a:solidFill>
-                <a:effectLst/>
-                <a:latin typeface="+mn-lt"/>
-                <a:ea typeface="+mn-ea"/>
-                <a:cs typeface="+mn-cs"/>
-              </a:rPr>
-              <a:t>, and </a:t>
-            </a:r>
-            <a:r>
-              <a:rPr lang="en-US" sz="1200" b="0" i="0" u="none" strike="noStrike" kern="1200" dirty="0" smtClean="0">
-                <a:solidFill>
-                  <a:schemeClr val="tx1"/>
-                </a:solidFill>
-                <a:effectLst/>
-                <a:latin typeface="+mn-lt"/>
-                <a:ea typeface="+mn-ea"/>
-                <a:cs typeface="+mn-cs"/>
-                <a:hlinkClick r:id="rId7" tooltip="Internet access"/>
-              </a:rPr>
-              <a:t>network connectivity</a:t>
-            </a:r>
-            <a:r>
-              <a:rPr lang="en-US" sz="1200" b="0" i="0" kern="1200" dirty="0" smtClean="0">
-                <a:solidFill>
-                  <a:schemeClr val="tx1"/>
-                </a:solidFill>
-                <a:effectLst/>
-                <a:latin typeface="+mn-lt"/>
-                <a:ea typeface="+mn-ea"/>
-                <a:cs typeface="+mn-cs"/>
-              </a:rPr>
-              <a:t> that enables these objects to collect and exchange data.</a:t>
-            </a:r>
-            <a:r>
-              <a:rPr lang="en-US" sz="1200" b="0" i="0" u="none" strike="noStrike" kern="1200" baseline="30000" dirty="0" smtClean="0">
-                <a:solidFill>
-                  <a:schemeClr val="tx1"/>
-                </a:solidFill>
-                <a:effectLst/>
-                <a:latin typeface="+mn-lt"/>
-                <a:ea typeface="+mn-ea"/>
-                <a:cs typeface="+mn-cs"/>
-                <a:hlinkClick r:id="rId8"/>
-              </a:rPr>
-              <a:t>[1]</a:t>
-            </a:r>
-            <a:r>
-              <a:rPr lang="en-US" sz="1200" b="0" i="0" kern="1200" dirty="0" smtClean="0">
-                <a:solidFill>
-                  <a:schemeClr val="tx1"/>
-                </a:solidFill>
-                <a:effectLst/>
-                <a:latin typeface="+mn-lt"/>
-                <a:ea typeface="+mn-ea"/>
-                <a:cs typeface="+mn-cs"/>
-              </a:rPr>
-              <a:t> The </a:t>
-            </a:r>
-            <a:r>
-              <a:rPr lang="en-US" sz="1200" b="0" i="0" kern="1200" dirty="0" err="1" smtClean="0">
-                <a:solidFill>
-                  <a:schemeClr val="tx1"/>
-                </a:solidFill>
-                <a:effectLst/>
-                <a:latin typeface="+mn-lt"/>
-                <a:ea typeface="+mn-ea"/>
-                <a:cs typeface="+mn-cs"/>
-              </a:rPr>
-              <a:t>IoT</a:t>
-            </a:r>
-            <a:r>
-              <a:rPr lang="en-US" sz="1200" b="0" i="0" kern="1200" dirty="0" smtClean="0">
-                <a:solidFill>
-                  <a:schemeClr val="tx1"/>
-                </a:solidFill>
-                <a:effectLst/>
-                <a:latin typeface="+mn-lt"/>
-                <a:ea typeface="+mn-ea"/>
-                <a:cs typeface="+mn-cs"/>
-              </a:rPr>
-              <a:t> allows objects to be sensed and controlled remotely across existing network infrastructure,</a:t>
-            </a:r>
-            <a:r>
-              <a:rPr lang="en-US" sz="1200" b="0" i="0" u="none" strike="noStrike" kern="1200" baseline="30000" dirty="0" smtClean="0">
-                <a:solidFill>
-                  <a:schemeClr val="tx1"/>
-                </a:solidFill>
-                <a:effectLst/>
-                <a:latin typeface="+mn-lt"/>
-                <a:ea typeface="+mn-ea"/>
-                <a:cs typeface="+mn-cs"/>
-                <a:hlinkClick r:id="rId9"/>
-              </a:rPr>
-              <a:t>[2]</a:t>
-            </a:r>
-            <a:r>
-              <a:rPr lang="en-US" sz="1200" b="0" i="0" kern="1200" dirty="0" smtClean="0">
-                <a:solidFill>
-                  <a:schemeClr val="tx1"/>
-                </a:solidFill>
-                <a:effectLst/>
-                <a:latin typeface="+mn-lt"/>
-                <a:ea typeface="+mn-ea"/>
-                <a:cs typeface="+mn-cs"/>
-              </a:rPr>
-              <a:t> creating opportunities for more direct integration of the physical world into computer-based systems, and resulting in improved efficiency, accuracy and economic benefit;</a:t>
-            </a:r>
-            <a:r>
-              <a:rPr lang="en-US" sz="1200" b="0" i="0" u="none" strike="noStrike" kern="1200" baseline="30000" dirty="0" smtClean="0">
-                <a:solidFill>
-                  <a:schemeClr val="tx1"/>
-                </a:solidFill>
-                <a:effectLst/>
-                <a:latin typeface="+mn-lt"/>
-                <a:ea typeface="+mn-ea"/>
-                <a:cs typeface="+mn-cs"/>
-                <a:hlinkClick r:id="rId10"/>
-              </a:rPr>
-              <a:t>[3]</a:t>
-            </a:r>
-            <a:r>
-              <a:rPr lang="en-US" sz="1200" b="0" i="0" u="none" strike="noStrike" kern="1200" baseline="30000" dirty="0" smtClean="0">
-                <a:solidFill>
-                  <a:schemeClr val="tx1"/>
-                </a:solidFill>
-                <a:effectLst/>
-                <a:latin typeface="+mn-lt"/>
-                <a:ea typeface="+mn-ea"/>
-                <a:cs typeface="+mn-cs"/>
-                <a:hlinkClick r:id="rId11"/>
-              </a:rPr>
-              <a:t>[4]</a:t>
-            </a:r>
-            <a:r>
-              <a:rPr lang="en-US" sz="1200" b="0" i="0" u="none" strike="noStrike" kern="1200" baseline="30000" dirty="0" smtClean="0">
-                <a:solidFill>
-                  <a:schemeClr val="tx1"/>
-                </a:solidFill>
-                <a:effectLst/>
-                <a:latin typeface="+mn-lt"/>
-                <a:ea typeface="+mn-ea"/>
-                <a:cs typeface="+mn-cs"/>
-                <a:hlinkClick r:id="rId12"/>
-              </a:rPr>
-              <a:t>[5]</a:t>
-            </a:r>
-            <a:r>
-              <a:rPr lang="en-US" sz="1200" b="0" i="0" u="none" strike="noStrike" kern="1200" baseline="30000" dirty="0" smtClean="0">
-                <a:solidFill>
-                  <a:schemeClr val="tx1"/>
-                </a:solidFill>
-                <a:effectLst/>
-                <a:latin typeface="+mn-lt"/>
-                <a:ea typeface="+mn-ea"/>
-                <a:cs typeface="+mn-cs"/>
-                <a:hlinkClick r:id="rId13"/>
-              </a:rPr>
-              <a:t>[6]</a:t>
-            </a:r>
-            <a:r>
-              <a:rPr lang="en-US" sz="1200" b="0" i="0" u="none" strike="noStrike" kern="1200" baseline="30000" dirty="0" smtClean="0">
-                <a:solidFill>
-                  <a:schemeClr val="tx1"/>
-                </a:solidFill>
-                <a:effectLst/>
-                <a:latin typeface="+mn-lt"/>
-                <a:ea typeface="+mn-ea"/>
-                <a:cs typeface="+mn-cs"/>
-                <a:hlinkClick r:id="rId14"/>
-              </a:rPr>
-              <a:t>[7]</a:t>
-            </a:r>
-            <a:r>
-              <a:rPr lang="en-US" sz="1200" b="0" i="0" u="none" strike="noStrike" kern="1200" baseline="30000" dirty="0" smtClean="0">
-                <a:solidFill>
-                  <a:schemeClr val="tx1"/>
-                </a:solidFill>
-                <a:effectLst/>
-                <a:latin typeface="+mn-lt"/>
-                <a:ea typeface="+mn-ea"/>
-                <a:cs typeface="+mn-cs"/>
-                <a:hlinkClick r:id="rId15"/>
-              </a:rPr>
-              <a:t>[8]</a:t>
-            </a:r>
-            <a:r>
-              <a:rPr lang="en-US" sz="1200" b="0" i="0" kern="1200" dirty="0" smtClean="0">
-                <a:solidFill>
-                  <a:schemeClr val="tx1"/>
-                </a:solidFill>
-                <a:effectLst/>
-                <a:latin typeface="+mn-lt"/>
-                <a:ea typeface="+mn-ea"/>
-                <a:cs typeface="+mn-cs"/>
-              </a:rPr>
-              <a:t> when </a:t>
-            </a:r>
-            <a:r>
-              <a:rPr lang="en-US" sz="1200" b="0" i="0" kern="1200" dirty="0" err="1" smtClean="0">
-                <a:solidFill>
-                  <a:schemeClr val="tx1"/>
-                </a:solidFill>
-                <a:effectLst/>
-                <a:latin typeface="+mn-lt"/>
-                <a:ea typeface="+mn-ea"/>
-                <a:cs typeface="+mn-cs"/>
-              </a:rPr>
-              <a:t>IoT</a:t>
-            </a:r>
-            <a:r>
-              <a:rPr lang="en-US" sz="1200" b="0" i="0" kern="1200" dirty="0" smtClean="0">
-                <a:solidFill>
-                  <a:schemeClr val="tx1"/>
-                </a:solidFill>
-                <a:effectLst/>
-                <a:latin typeface="+mn-lt"/>
-                <a:ea typeface="+mn-ea"/>
-                <a:cs typeface="+mn-cs"/>
-              </a:rPr>
-              <a:t> is augmented with sensors and actuators, the technology becomes an instance of the more general class of </a:t>
-            </a:r>
-            <a:r>
-              <a:rPr lang="en-US" sz="1200" b="0" i="0" u="none" strike="noStrike" kern="1200" dirty="0" smtClean="0">
-                <a:solidFill>
-                  <a:schemeClr val="tx1"/>
-                </a:solidFill>
-                <a:effectLst/>
-                <a:latin typeface="+mn-lt"/>
-                <a:ea typeface="+mn-ea"/>
-                <a:cs typeface="+mn-cs"/>
-                <a:hlinkClick r:id="rId16" tooltip="Cyber-physical system"/>
-              </a:rPr>
-              <a:t>cyber-physical systems</a:t>
-            </a:r>
-            <a:r>
-              <a:rPr lang="en-US" sz="1200" b="0" i="0" kern="1200" dirty="0" smtClean="0">
-                <a:solidFill>
-                  <a:schemeClr val="tx1"/>
-                </a:solidFill>
-                <a:effectLst/>
-                <a:latin typeface="+mn-lt"/>
-                <a:ea typeface="+mn-ea"/>
-                <a:cs typeface="+mn-cs"/>
-              </a:rPr>
-              <a:t>, which also encompasses technologies such as </a:t>
-            </a:r>
-            <a:r>
-              <a:rPr lang="en-US" sz="1200" b="0" i="0" u="none" strike="noStrike" kern="1200" dirty="0" smtClean="0">
-                <a:solidFill>
-                  <a:schemeClr val="tx1"/>
-                </a:solidFill>
-                <a:effectLst/>
-                <a:latin typeface="+mn-lt"/>
-                <a:ea typeface="+mn-ea"/>
-                <a:cs typeface="+mn-cs"/>
-                <a:hlinkClick r:id="rId17" tooltip="Smart grid"/>
-              </a:rPr>
-              <a:t>smart grids</a:t>
-            </a:r>
-            <a:r>
-              <a:rPr lang="en-US" sz="1200" b="0" i="0" kern="1200" dirty="0" smtClean="0">
-                <a:solidFill>
-                  <a:schemeClr val="tx1"/>
-                </a:solidFill>
-                <a:effectLst/>
-                <a:latin typeface="+mn-lt"/>
-                <a:ea typeface="+mn-ea"/>
-                <a:cs typeface="+mn-cs"/>
-              </a:rPr>
-              <a:t>, </a:t>
-            </a:r>
-            <a:r>
-              <a:rPr lang="en-US" sz="1200" b="0" i="0" u="none" strike="noStrike" kern="1200" dirty="0" smtClean="0">
-                <a:solidFill>
-                  <a:schemeClr val="tx1"/>
-                </a:solidFill>
-                <a:effectLst/>
-                <a:latin typeface="+mn-lt"/>
-                <a:ea typeface="+mn-ea"/>
-                <a:cs typeface="+mn-cs"/>
-                <a:hlinkClick r:id="rId18" tooltip="Smart home"/>
-              </a:rPr>
-              <a:t>smart </a:t>
-            </a:r>
-            <a:r>
-              <a:rPr lang="en-US" sz="1200" b="0" i="0" u="none" strike="noStrike" kern="1200" dirty="0" err="1" smtClean="0">
-                <a:solidFill>
-                  <a:schemeClr val="tx1"/>
-                </a:solidFill>
-                <a:effectLst/>
-                <a:latin typeface="+mn-lt"/>
-                <a:ea typeface="+mn-ea"/>
-                <a:cs typeface="+mn-cs"/>
-                <a:hlinkClick r:id="rId18" tooltip="Smart home"/>
-              </a:rPr>
-              <a:t>homes</a:t>
-            </a:r>
-            <a:r>
-              <a:rPr lang="en-US" sz="1200" b="0" i="0" kern="1200" dirty="0" err="1" smtClean="0">
-                <a:solidFill>
-                  <a:schemeClr val="tx1"/>
-                </a:solidFill>
-                <a:effectLst/>
-                <a:latin typeface="+mn-lt"/>
-                <a:ea typeface="+mn-ea"/>
-                <a:cs typeface="+mn-cs"/>
-              </a:rPr>
-              <a:t>,</a:t>
-            </a:r>
-            <a:r>
-              <a:rPr lang="en-US" sz="1200" b="0" i="0" u="none" strike="noStrike" kern="1200" dirty="0" err="1" smtClean="0">
-                <a:solidFill>
-                  <a:schemeClr val="tx1"/>
-                </a:solidFill>
-                <a:effectLst/>
-                <a:latin typeface="+mn-lt"/>
-                <a:ea typeface="+mn-ea"/>
-                <a:cs typeface="+mn-cs"/>
-                <a:hlinkClick r:id="rId19" tooltip="Intelligent transportation"/>
-              </a:rPr>
-              <a:t>intelligent</a:t>
-            </a:r>
-            <a:r>
-              <a:rPr lang="en-US" sz="1200" b="0" i="0" u="none" strike="noStrike" kern="1200" dirty="0" smtClean="0">
-                <a:solidFill>
-                  <a:schemeClr val="tx1"/>
-                </a:solidFill>
-                <a:effectLst/>
-                <a:latin typeface="+mn-lt"/>
-                <a:ea typeface="+mn-ea"/>
-                <a:cs typeface="+mn-cs"/>
-                <a:hlinkClick r:id="rId19" tooltip="Intelligent transportation"/>
-              </a:rPr>
-              <a:t> transportation</a:t>
-            </a:r>
-            <a:r>
-              <a:rPr lang="en-US" sz="1200" b="0" i="0" kern="1200" dirty="0" smtClean="0">
-                <a:solidFill>
-                  <a:schemeClr val="tx1"/>
-                </a:solidFill>
-                <a:effectLst/>
-                <a:latin typeface="+mn-lt"/>
-                <a:ea typeface="+mn-ea"/>
-                <a:cs typeface="+mn-cs"/>
-              </a:rPr>
-              <a:t> and </a:t>
-            </a:r>
-            <a:r>
-              <a:rPr lang="en-US" sz="1200" b="0" i="0" u="none" strike="noStrike" kern="1200" dirty="0" smtClean="0">
-                <a:solidFill>
-                  <a:schemeClr val="tx1"/>
-                </a:solidFill>
-                <a:effectLst/>
-                <a:latin typeface="+mn-lt"/>
-                <a:ea typeface="+mn-ea"/>
-                <a:cs typeface="+mn-cs"/>
-                <a:hlinkClick r:id="rId20" tooltip="Smart city"/>
-              </a:rPr>
-              <a:t>smart cities</a:t>
-            </a:r>
-            <a:r>
-              <a:rPr lang="en-US" sz="1200" b="0" i="0" kern="1200" dirty="0" smtClean="0">
-                <a:solidFill>
-                  <a:schemeClr val="tx1"/>
-                </a:solidFill>
-                <a:effectLst/>
-                <a:latin typeface="+mn-lt"/>
-                <a:ea typeface="+mn-ea"/>
-                <a:cs typeface="+mn-cs"/>
-              </a:rPr>
-              <a:t>. Each thing is uniquely identifiable through its embedded computing system but is able to interoperate within the existing </a:t>
-            </a:r>
-            <a:r>
-              <a:rPr lang="en-US" sz="1200" b="0" i="0" u="none" strike="noStrike" kern="1200" dirty="0" smtClean="0">
-                <a:solidFill>
-                  <a:schemeClr val="tx1"/>
-                </a:solidFill>
-                <a:effectLst/>
-                <a:latin typeface="+mn-lt"/>
-                <a:ea typeface="+mn-ea"/>
-                <a:cs typeface="+mn-cs"/>
-                <a:hlinkClick r:id="rId21" tooltip="Internet"/>
-              </a:rPr>
-              <a:t>Internet</a:t>
-            </a:r>
-            <a:r>
-              <a:rPr lang="en-US" sz="1200" b="0" i="0" kern="1200" dirty="0" smtClean="0">
-                <a:solidFill>
-                  <a:schemeClr val="tx1"/>
-                </a:solidFill>
-                <a:effectLst/>
-                <a:latin typeface="+mn-lt"/>
-                <a:ea typeface="+mn-ea"/>
-                <a:cs typeface="+mn-cs"/>
-              </a:rPr>
-              <a:t> infrastructure. Experts estimate that the </a:t>
-            </a:r>
-            <a:r>
-              <a:rPr lang="en-US" sz="1200" b="0" i="0" kern="1200" dirty="0" err="1" smtClean="0">
-                <a:solidFill>
-                  <a:schemeClr val="tx1"/>
-                </a:solidFill>
-                <a:effectLst/>
-                <a:latin typeface="+mn-lt"/>
-                <a:ea typeface="+mn-ea"/>
-                <a:cs typeface="+mn-cs"/>
-              </a:rPr>
-              <a:t>IoT</a:t>
-            </a:r>
-            <a:r>
-              <a:rPr lang="en-US" sz="1200" b="0" i="0" kern="1200" dirty="0" smtClean="0">
-                <a:solidFill>
-                  <a:schemeClr val="tx1"/>
-                </a:solidFill>
-                <a:effectLst/>
-                <a:latin typeface="+mn-lt"/>
-                <a:ea typeface="+mn-ea"/>
-                <a:cs typeface="+mn-cs"/>
-              </a:rPr>
-              <a:t> will consist of almost 50 billion objects by 2020.</a:t>
-            </a:r>
-            <a:r>
-              <a:rPr lang="en-US" sz="1200" b="0" i="0" u="none" strike="noStrike" kern="1200" baseline="30000" dirty="0" smtClean="0">
-                <a:solidFill>
-                  <a:schemeClr val="tx1"/>
-                </a:solidFill>
-                <a:effectLst/>
-                <a:latin typeface="+mn-lt"/>
-                <a:ea typeface="+mn-ea"/>
-                <a:cs typeface="+mn-cs"/>
-                <a:hlinkClick r:id="rId22"/>
-              </a:rPr>
-              <a:t>[9]</a:t>
+              <a:t>Easy prototyping with low-cost microcontrollers – Arduino, Pi, and others</a:t>
             </a:r>
             <a:endParaRPr lang="en-US" dirty="0"/>
           </a:p>
@@ -1156,6 +661,195 @@
     <p:extLst>
       <p:ext uri="{BB962C8B-B14F-4D97-AF65-F5344CB8AC3E}">
         <p14:creationId xmlns:p14="http://schemas.microsoft.com/office/powerpoint/2010/main" val="1718837711"/>
+      </p:ext>
+    </p:extLst>
+  </p:cSld>
+  <p:clrMapOvr>
+    <a:masterClrMapping/>
+  </p:clrMapOvr>
+</p:notes>
+</file>
+
+<file path=ppt/notesSlides/notesSlide2.xml><?xml version="1.0" encoding="utf-8"?>
+<p:notes xmlns:a="http://schemas.openxmlformats.org/drawingml/2006/main" xmlns:r="http://schemas.openxmlformats.org/officeDocument/2006/relationships" xmlns:p="http://schemas.openxmlformats.org/presentationml/2006/main">
+  <p:cSld>
+    <p:spTree>
+      <p:nvGrpSpPr>
+        <p:cNvPr id="1" name=""/>
+        <p:cNvGrpSpPr/>
+        <p:nvPr/>
+      </p:nvGrpSpPr>
+      <p:grpSpPr>
+        <a:xfrm>
+          <a:off x="0" y="0"/>
+          <a:ext cx="0" cy="0"/>
+          <a:chOff x="0" y="0"/>
+          <a:chExt cx="0" cy="0"/>
+        </a:xfrm>
+      </p:grpSpPr>
+      <p:sp>
+        <p:nvSpPr>
+          <p:cNvPr id="2" name="Slide Image Placeholder 1"/>
+          <p:cNvSpPr>
+            <a:spLocks noGrp="1" noRot="1" noChangeAspect="1"/>
+          </p:cNvSpPr>
+          <p:nvPr>
+            <p:ph type="sldImg"/>
+          </p:nvPr>
+        </p:nvSpPr>
+        <p:spPr/>
+      </p:sp>
+      <p:sp>
+        <p:nvSpPr>
+          <p:cNvPr id="3" name="Notes Placeholder 2"/>
+          <p:cNvSpPr>
+            <a:spLocks noGrp="1"/>
+          </p:cNvSpPr>
+          <p:nvPr>
+            <p:ph type="body" idx="1"/>
+          </p:nvPr>
+        </p:nvSpPr>
+        <p:spPr/>
+        <p:txBody>
+          <a:bodyPr/>
+          <a:lstStyle/>
+          <a:p>
+            <a:r>
+              <a:rPr lang="en-US" dirty="0" smtClean="0"/>
+              <a:t>Reference</a:t>
+            </a:r>
+            <a:r>
+              <a:rPr lang="en-US" baseline="0" dirty="0" smtClean="0"/>
+              <a:t> GPIO pins</a:t>
+            </a:r>
+          </a:p>
+        </p:txBody>
+      </p:sp>
+      <p:sp>
+        <p:nvSpPr>
+          <p:cNvPr id="4" name="Slide Number Placeholder 3"/>
+          <p:cNvSpPr>
+            <a:spLocks noGrp="1"/>
+          </p:cNvSpPr>
+          <p:nvPr>
+            <p:ph type="sldNum" sz="quarter" idx="10"/>
+          </p:nvPr>
+        </p:nvSpPr>
+        <p:spPr/>
+        <p:txBody>
+          <a:bodyPr/>
+          <a:lstStyle/>
+          <a:p>
+            <a:fld id="{C2B6836B-B73B-4165-AA27-152CE3B99B18}" type="slidenum">
+              <a:rPr lang="en-US" smtClean="0"/>
+              <a:t>3</a:t>
+            </a:fld>
+            <a:endParaRPr lang="en-US"/>
+          </a:p>
+        </p:txBody>
+      </p:sp>
+    </p:spTree>
+    <p:extLst>
+      <p:ext uri="{BB962C8B-B14F-4D97-AF65-F5344CB8AC3E}">
+        <p14:creationId xmlns:p14="http://schemas.microsoft.com/office/powerpoint/2010/main" val="2376334352"/>
+      </p:ext>
+    </p:extLst>
+  </p:cSld>
+  <p:clrMapOvr>
+    <a:masterClrMapping/>
+  </p:clrMapOvr>
+</p:notes>
+</file>
+
+<file path=ppt/notesSlides/notesSlide3.xml><?xml version="1.0" encoding="utf-8"?>
+<p:notes xmlns:a="http://schemas.openxmlformats.org/drawingml/2006/main" xmlns:r="http://schemas.openxmlformats.org/officeDocument/2006/relationships" xmlns:p="http://schemas.openxmlformats.org/presentationml/2006/main">
+  <p:cSld>
+    <p:spTree>
+      <p:nvGrpSpPr>
+        <p:cNvPr id="1" name=""/>
+        <p:cNvGrpSpPr/>
+        <p:nvPr/>
+      </p:nvGrpSpPr>
+      <p:grpSpPr>
+        <a:xfrm>
+          <a:off x="0" y="0"/>
+          <a:ext cx="0" cy="0"/>
+          <a:chOff x="0" y="0"/>
+          <a:chExt cx="0" cy="0"/>
+        </a:xfrm>
+      </p:grpSpPr>
+      <p:sp>
+        <p:nvSpPr>
+          <p:cNvPr id="2" name="Slide Image Placeholder 1"/>
+          <p:cNvSpPr>
+            <a:spLocks noGrp="1" noRot="1" noChangeAspect="1"/>
+          </p:cNvSpPr>
+          <p:nvPr>
+            <p:ph type="sldImg"/>
+          </p:nvPr>
+        </p:nvSpPr>
+        <p:spPr/>
+      </p:sp>
+      <p:sp>
+        <p:nvSpPr>
+          <p:cNvPr id="3" name="Notes Placeholder 2"/>
+          <p:cNvSpPr>
+            <a:spLocks noGrp="1"/>
+          </p:cNvSpPr>
+          <p:nvPr>
+            <p:ph type="body" idx="1"/>
+          </p:nvPr>
+        </p:nvSpPr>
+        <p:spPr/>
+        <p:txBody>
+          <a:bodyPr/>
+          <a:lstStyle/>
+          <a:p>
+            <a:r>
+              <a:rPr lang="en-US" dirty="0" smtClean="0"/>
+              <a:t>Be cautious,</a:t>
+            </a:r>
+            <a:r>
+              <a:rPr lang="en-US" baseline="0" dirty="0" smtClean="0"/>
+              <a:t> but not scared</a:t>
+            </a:r>
+          </a:p>
+          <a:p>
+            <a:r>
+              <a:rPr lang="en-US" baseline="0" dirty="0" smtClean="0"/>
+              <a:t>Use the internet and books</a:t>
+            </a:r>
+            <a:endParaRPr lang="en-US" dirty="0"/>
+          </a:p>
+        </p:txBody>
+      </p:sp>
+      <p:sp>
+        <p:nvSpPr>
+          <p:cNvPr id="4" name="Slide Number Placeholder 3"/>
+          <p:cNvSpPr>
+            <a:spLocks noGrp="1"/>
+          </p:cNvSpPr>
+          <p:nvPr>
+            <p:ph type="sldNum" sz="quarter" idx="10"/>
+          </p:nvPr>
+        </p:nvSpPr>
+        <p:spPr/>
+        <p:txBody>
+          <a:bodyPr/>
+          <a:lstStyle/>
+          <a:p>
+            <a:fld id="{C2B6836B-B73B-4165-AA27-152CE3B99B18}" type="slidenum">
+              <a:rPr lang="en-US" smtClean="0"/>
+              <a:t>19</a:t>
+            </a:fld>
+            <a:endParaRPr lang="en-US"/>
+          </a:p>
+        </p:txBody>
+      </p:sp>
+    </p:spTree>
+    <p:extLst>
+      <p:ext uri="{BB962C8B-B14F-4D97-AF65-F5344CB8AC3E}">
+        <p14:creationId xmlns:p14="http://schemas.microsoft.com/office/powerpoint/2010/main" val="3263626988"/>
       </p:ext>
     </p:extLst>
   </p:cSld>
@@ -1378,7 +1072,7 @@
           <a:p>
             <a:fld id="{370632EE-B4C6-4BAB-A585-9754248B6A42}" type="datetimeFigureOut">
               <a:rPr lang="en-US" smtClean="0"/>
-              <a:t>5/15/2016</a:t>
+              <a:t>5/16/2016</a:t>
             </a:fld>
             <a:endParaRPr lang="en-US"/>
           </a:p>
@@ -1669,7 +1363,7 @@
           <a:p>
             <a:fld id="{370632EE-B4C6-4BAB-A585-9754248B6A42}" type="datetimeFigureOut">
               <a:rPr lang="en-US" smtClean="0"/>
-              <a:t>5/15/2016</a:t>
+              <a:t>5/16/2016</a:t>
             </a:fld>
             <a:endParaRPr lang="en-US"/>
           </a:p>
@@ -1928,7 +1622,7 @@
           <a:p>
             <a:fld id="{370632EE-B4C6-4BAB-A585-9754248B6A42}" type="datetimeFigureOut">
               <a:rPr lang="en-US" smtClean="0"/>
-              <a:t>5/15/2016</a:t>
+              <a:t>5/16/2016</a:t>
             </a:fld>
             <a:endParaRPr lang="en-US"/>
           </a:p>
@@ -2397,7 +2091,7 @@
           <a:p>
             <a:fld id="{370632EE-B4C6-4BAB-A585-9754248B6A42}" type="datetimeFigureOut">
               <a:rPr lang="en-US" smtClean="0"/>
-              <a:t>5/15/2016</a:t>
+              <a:t>5/16/2016</a:t>
             </a:fld>
             <a:endParaRPr lang="en-US"/>
           </a:p>
@@ -2577,7 +2271,7 @@
           <a:p>
             <a:fld id="{370632EE-B4C6-4BAB-A585-9754248B6A42}" type="datetimeFigureOut">
               <a:rPr lang="en-US" smtClean="0"/>
-              <a:t>5/15/2016</a:t>
+              <a:t>5/16/2016</a:t>
             </a:fld>
             <a:endParaRPr lang="en-US"/>
           </a:p>
@@ -3153,7 +2847,7 @@
           <a:p>
             <a:fld id="{370632EE-B4C6-4BAB-A585-9754248B6A42}" type="datetimeFigureOut">
               <a:rPr lang="en-US" smtClean="0"/>
-              <a:t>5/15/2016</a:t>
+              <a:t>5/16/2016</a:t>
             </a:fld>
             <a:endParaRPr lang="en-US"/>
           </a:p>
@@ -3485,7 +3179,7 @@
           <a:p>
             <a:fld id="{370632EE-B4C6-4BAB-A585-9754248B6A42}" type="datetimeFigureOut">
               <a:rPr lang="en-US" smtClean="0"/>
-              <a:t>5/15/2016</a:t>
+              <a:t>5/16/2016</a:t>
             </a:fld>
             <a:endParaRPr lang="en-US"/>
           </a:p>
@@ -3660,7 +3354,7 @@
           <a:p>
             <a:fld id="{370632EE-B4C6-4BAB-A585-9754248B6A42}" type="datetimeFigureOut">
               <a:rPr lang="en-US" smtClean="0"/>
-              <a:t>5/15/2016</a:t>
+              <a:t>5/16/2016</a:t>
             </a:fld>
             <a:endParaRPr lang="en-US"/>
           </a:p>
@@ -3840,7 +3534,7 @@
           <a:p>
             <a:fld id="{370632EE-B4C6-4BAB-A585-9754248B6A42}" type="datetimeFigureOut">
               <a:rPr lang="en-US" smtClean="0"/>
-              <a:t>5/15/2016</a:t>
+              <a:t>5/16/2016</a:t>
             </a:fld>
             <a:endParaRPr lang="en-US"/>
           </a:p>
@@ -4010,7 +3704,7 @@
           <a:p>
             <a:fld id="{370632EE-B4C6-4BAB-A585-9754248B6A42}" type="datetimeFigureOut">
               <a:rPr lang="en-US" smtClean="0"/>
-              <a:t>5/15/2016</a:t>
+              <a:t>5/16/2016</a:t>
             </a:fld>
             <a:endParaRPr lang="en-US"/>
           </a:p>
@@ -4267,7 +3961,7 @@
           <a:p>
             <a:fld id="{370632EE-B4C6-4BAB-A585-9754248B6A42}" type="datetimeFigureOut">
               <a:rPr lang="en-US" smtClean="0"/>
-              <a:t>5/15/2016</a:t>
+              <a:t>5/16/2016</a:t>
             </a:fld>
             <a:endParaRPr lang="en-US"/>
           </a:p>
@@ -4559,7 +4253,7 @@
           <a:p>
             <a:fld id="{370632EE-B4C6-4BAB-A585-9754248B6A42}" type="datetimeFigureOut">
               <a:rPr lang="en-US" smtClean="0"/>
-              <a:t>5/15/2016</a:t>
+              <a:t>5/16/2016</a:t>
             </a:fld>
             <a:endParaRPr lang="en-US"/>
           </a:p>
@@ -4989,7 +4683,7 @@
           <a:p>
             <a:fld id="{370632EE-B4C6-4BAB-A585-9754248B6A42}" type="datetimeFigureOut">
               <a:rPr lang="en-US" smtClean="0"/>
-              <a:t>5/15/2016</a:t>
+              <a:t>5/16/2016</a:t>
             </a:fld>
             <a:endParaRPr lang="en-US"/>
           </a:p>
@@ -5107,7 +4801,7 @@
           <a:p>
             <a:fld id="{370632EE-B4C6-4BAB-A585-9754248B6A42}" type="datetimeFigureOut">
               <a:rPr lang="en-US" smtClean="0"/>
-              <a:t>5/15/2016</a:t>
+              <a:t>5/16/2016</a:t>
             </a:fld>
             <a:endParaRPr lang="en-US"/>
           </a:p>
@@ -5202,7 +4896,7 @@
           <a:p>
             <a:fld id="{370632EE-B4C6-4BAB-A585-9754248B6A42}" type="datetimeFigureOut">
               <a:rPr lang="en-US" smtClean="0"/>
-              <a:t>5/15/2016</a:t>
+              <a:t>5/16/2016</a:t>
             </a:fld>
             <a:endParaRPr lang="en-US"/>
           </a:p>
@@ -5485,7 +5179,7 @@
           <a:p>
             <a:fld id="{370632EE-B4C6-4BAB-A585-9754248B6A42}" type="datetimeFigureOut">
               <a:rPr lang="en-US" smtClean="0"/>
-              <a:t>5/15/2016</a:t>
+              <a:t>5/16/2016</a:t>
             </a:fld>
             <a:endParaRPr lang="en-US"/>
           </a:p>
@@ -5776,7 +5470,7 @@
           <a:p>
             <a:fld id="{370632EE-B4C6-4BAB-A585-9754248B6A42}" type="datetimeFigureOut">
               <a:rPr lang="en-US" smtClean="0"/>
-              <a:t>5/15/2016</a:t>
+              <a:t>5/16/2016</a:t>
             </a:fld>
             <a:endParaRPr lang="en-US"/>
           </a:p>
@@ -6007,7 +5701,7 @@
           <a:p>
             <a:fld id="{370632EE-B4C6-4BAB-A585-9754248B6A42}" type="datetimeFigureOut">
               <a:rPr lang="en-US" smtClean="0"/>
-              <a:t>5/15/2016</a:t>
+              <a:t>5/16/2016</a:t>
             </a:fld>
             <a:endParaRPr lang="en-US"/>
           </a:p>
@@ -6820,13 +6514,8 @@
           <a:p>
             <a:r>
               <a:rPr lang="en-US" dirty="0" smtClean="0"/>
-              <a:t>Part </a:t>
-            </a:r>
-            <a:r>
-              <a:rPr lang="en-US" dirty="0" smtClean="0"/>
-              <a:t>2, Controlling the World</a:t>
-            </a:r>
-            <a:endParaRPr lang="en-US" dirty="0" smtClean="0"/>
+              <a:t>Part 2, Controlling the World</a:t>
+            </a:r>
           </a:p>
           <a:p>
             <a:r>
@@ -6886,485 +6575,6 @@
         </p:nvSpPr>
         <p:spPr/>
         <p:txBody>
-          <a:bodyPr/>
-          <a:lstStyle/>
-          <a:p>
-            <a:r>
-              <a:rPr lang="en-US" dirty="0" err="1" smtClean="0"/>
-              <a:t>Raspi</a:t>
-            </a:r>
-            <a:r>
-              <a:rPr lang="en-US" dirty="0" smtClean="0"/>
-              <a:t> GPIO</a:t>
-            </a:r>
-            <a:endParaRPr lang="en-US" dirty="0"/>
-          </a:p>
-        </p:txBody>
-      </p:sp>
-      <p:sp>
-        <p:nvSpPr>
-          <p:cNvPr id="3" name="Content Placeholder 2"/>
-          <p:cNvSpPr>
-            <a:spLocks noGrp="1"/>
-          </p:cNvSpPr>
-          <p:nvPr>
-            <p:ph sz="half" idx="1"/>
-          </p:nvPr>
-        </p:nvSpPr>
-        <p:spPr/>
-        <p:txBody>
-          <a:bodyPr>
-            <a:normAutofit/>
-          </a:bodyPr>
-          <a:lstStyle/>
-          <a:p>
-            <a:r>
-              <a:rPr lang="en-US" sz="2000" cap="none" dirty="0" smtClean="0">
-                <a:ln w="0"/>
-                <a:solidFill>
-                  <a:schemeClr val="tx1"/>
-                </a:solidFill>
-                <a:effectLst>
-                  <a:outerShdw blurRad="38100" dist="19050" dir="2700000" algn="tl" rotWithShape="0">
-                    <a:schemeClr val="dk1">
-                      <a:alpha val="40000"/>
-                    </a:schemeClr>
-                  </a:outerShdw>
-                </a:effectLst>
-              </a:rPr>
-              <a:t>import </a:t>
-            </a:r>
-            <a:r>
-              <a:rPr lang="en-US" sz="2000" cap="none" dirty="0" err="1" smtClean="0">
-                <a:ln w="0"/>
-                <a:solidFill>
-                  <a:schemeClr val="tx1"/>
-                </a:solidFill>
-                <a:effectLst>
-                  <a:outerShdw blurRad="38100" dist="19050" dir="2700000" algn="tl" rotWithShape="0">
-                    <a:schemeClr val="dk1">
-                      <a:alpha val="40000"/>
-                    </a:schemeClr>
-                  </a:outerShdw>
-                </a:effectLst>
-              </a:rPr>
-              <a:t>RPi.GPIO</a:t>
-            </a:r>
-            <a:r>
-              <a:rPr lang="en-US" sz="2000" cap="none" dirty="0" smtClean="0">
-                <a:ln w="0"/>
-                <a:solidFill>
-                  <a:schemeClr val="tx1"/>
-                </a:solidFill>
-                <a:effectLst>
-                  <a:outerShdw blurRad="38100" dist="19050" dir="2700000" algn="tl" rotWithShape="0">
-                    <a:schemeClr val="dk1">
-                      <a:alpha val="40000"/>
-                    </a:schemeClr>
-                  </a:outerShdw>
-                </a:effectLst>
-              </a:rPr>
-              <a:t> as GPIO</a:t>
-            </a:r>
-          </a:p>
-          <a:p>
-            <a:r>
-              <a:rPr lang="en-US" sz="2000" cap="none" dirty="0" err="1" smtClean="0">
-                <a:ln w="0"/>
-                <a:solidFill>
-                  <a:schemeClr val="tx1"/>
-                </a:solidFill>
-                <a:effectLst>
-                  <a:outerShdw blurRad="38100" dist="19050" dir="2700000" algn="tl" rotWithShape="0">
-                    <a:schemeClr val="dk1">
-                      <a:alpha val="40000"/>
-                    </a:schemeClr>
-                  </a:outerShdw>
-                </a:effectLst>
-              </a:rPr>
-              <a:t>GPIO.setmode</a:t>
-            </a:r>
-            <a:r>
-              <a:rPr lang="en-US" sz="2000" cap="none" dirty="0" smtClean="0">
-                <a:ln w="0"/>
-                <a:solidFill>
-                  <a:schemeClr val="tx1"/>
-                </a:solidFill>
-                <a:effectLst>
-                  <a:outerShdw blurRad="38100" dist="19050" dir="2700000" algn="tl" rotWithShape="0">
-                    <a:schemeClr val="dk1">
-                      <a:alpha val="40000"/>
-                    </a:schemeClr>
-                  </a:outerShdw>
-                </a:effectLst>
-              </a:rPr>
-              <a:t>(&lt;mode&gt;)</a:t>
-            </a:r>
-          </a:p>
-          <a:p>
-            <a:pPr lvl="1"/>
-            <a:r>
-              <a:rPr lang="en-US" sz="1800" cap="none" dirty="0" smtClean="0">
-                <a:ln w="0"/>
-                <a:solidFill>
-                  <a:schemeClr val="tx1"/>
-                </a:solidFill>
-                <a:effectLst>
-                  <a:outerShdw blurRad="38100" dist="19050" dir="2700000" algn="tl" rotWithShape="0">
-                    <a:schemeClr val="dk1">
-                      <a:alpha val="40000"/>
-                    </a:schemeClr>
-                  </a:outerShdw>
-                </a:effectLst>
-              </a:rPr>
-              <a:t>GPIO.BOARD</a:t>
-            </a:r>
-          </a:p>
-          <a:p>
-            <a:pPr lvl="1"/>
-            <a:r>
-              <a:rPr lang="en-US" sz="1800" cap="none" dirty="0" smtClean="0">
-                <a:ln w="0"/>
-                <a:solidFill>
-                  <a:schemeClr val="tx1"/>
-                </a:solidFill>
-                <a:effectLst>
-                  <a:outerShdw blurRad="38100" dist="19050" dir="2700000" algn="tl" rotWithShape="0">
-                    <a:schemeClr val="dk1">
-                      <a:alpha val="40000"/>
-                    </a:schemeClr>
-                  </a:outerShdw>
-                </a:effectLst>
-              </a:rPr>
-              <a:t>GPIO.BCM</a:t>
-            </a:r>
-          </a:p>
-          <a:p>
-            <a:r>
-              <a:rPr lang="en-US" sz="2000" cap="none" dirty="0" err="1" smtClean="0">
-                <a:ln w="0"/>
-                <a:solidFill>
-                  <a:schemeClr val="tx1"/>
-                </a:solidFill>
-                <a:effectLst>
-                  <a:outerShdw blurRad="38100" dist="19050" dir="2700000" algn="tl" rotWithShape="0">
-                    <a:schemeClr val="dk1">
-                      <a:alpha val="40000"/>
-                    </a:schemeClr>
-                  </a:outerShdw>
-                </a:effectLst>
-              </a:rPr>
-              <a:t>GPIO.setup</a:t>
-            </a:r>
-            <a:r>
-              <a:rPr lang="en-US" sz="2000" cap="none" dirty="0" smtClean="0">
-                <a:ln w="0"/>
-                <a:solidFill>
-                  <a:schemeClr val="tx1"/>
-                </a:solidFill>
-                <a:effectLst>
-                  <a:outerShdw blurRad="38100" dist="19050" dir="2700000" algn="tl" rotWithShape="0">
-                    <a:schemeClr val="dk1">
-                      <a:alpha val="40000"/>
-                    </a:schemeClr>
-                  </a:outerShdw>
-                </a:effectLst>
-              </a:rPr>
-              <a:t>(&lt;channel&gt;, &lt;in/out&gt;)</a:t>
-            </a:r>
-          </a:p>
-          <a:p>
-            <a:pPr lvl="1"/>
-            <a:r>
-              <a:rPr lang="en-US" sz="1800" cap="none" dirty="0" smtClean="0">
-                <a:ln w="0"/>
-                <a:solidFill>
-                  <a:schemeClr val="tx1"/>
-                </a:solidFill>
-                <a:effectLst>
-                  <a:outerShdw blurRad="38100" dist="19050" dir="2700000" algn="tl" rotWithShape="0">
-                    <a:schemeClr val="dk1">
-                      <a:alpha val="40000"/>
-                    </a:schemeClr>
-                  </a:outerShdw>
-                </a:effectLst>
-              </a:rPr>
-              <a:t>GPIO.OUT</a:t>
-            </a:r>
-          </a:p>
-          <a:p>
-            <a:pPr lvl="1"/>
-            <a:r>
-              <a:rPr lang="en-US" sz="1800" cap="none" dirty="0" smtClean="0">
-                <a:ln w="0"/>
-                <a:solidFill>
-                  <a:schemeClr val="tx1"/>
-                </a:solidFill>
-                <a:effectLst>
-                  <a:outerShdw blurRad="38100" dist="19050" dir="2700000" algn="tl" rotWithShape="0">
-                    <a:schemeClr val="dk1">
-                      <a:alpha val="40000"/>
-                    </a:schemeClr>
-                  </a:outerShdw>
-                </a:effectLst>
-              </a:rPr>
-              <a:t>GPIO.IN</a:t>
-            </a:r>
-          </a:p>
-        </p:txBody>
-      </p:sp>
-      <p:sp>
-        <p:nvSpPr>
-          <p:cNvPr id="4" name="Content Placeholder 3"/>
-          <p:cNvSpPr>
-            <a:spLocks noGrp="1"/>
-          </p:cNvSpPr>
-          <p:nvPr>
-            <p:ph sz="half" idx="2"/>
-          </p:nvPr>
-        </p:nvSpPr>
-        <p:spPr/>
-        <p:txBody>
-          <a:bodyPr>
-            <a:normAutofit/>
-          </a:bodyPr>
-          <a:lstStyle/>
-          <a:p>
-            <a:r>
-              <a:rPr lang="en-US" sz="2000" cap="none" dirty="0" err="1" smtClean="0">
-                <a:ln w="0"/>
-                <a:solidFill>
-                  <a:schemeClr val="tx1"/>
-                </a:solidFill>
-                <a:effectLst>
-                  <a:outerShdw blurRad="38100" dist="19050" dir="2700000" algn="tl" rotWithShape="0">
-                    <a:schemeClr val="dk1">
-                      <a:alpha val="40000"/>
-                    </a:schemeClr>
-                  </a:outerShdw>
-                </a:effectLst>
-              </a:rPr>
-              <a:t>GPIO.input</a:t>
-            </a:r>
-            <a:r>
-              <a:rPr lang="en-US" sz="2000" cap="none" dirty="0" smtClean="0">
-                <a:ln w="0"/>
-                <a:solidFill>
-                  <a:schemeClr val="tx1"/>
-                </a:solidFill>
-                <a:effectLst>
-                  <a:outerShdw blurRad="38100" dist="19050" dir="2700000" algn="tl" rotWithShape="0">
-                    <a:schemeClr val="dk1">
-                      <a:alpha val="40000"/>
-                    </a:schemeClr>
-                  </a:outerShdw>
-                </a:effectLst>
-              </a:rPr>
-              <a:t>(&lt;channel&gt;)</a:t>
-            </a:r>
-          </a:p>
-          <a:p>
-            <a:r>
-              <a:rPr lang="en-US" sz="2000" cap="none" dirty="0" err="1" smtClean="0">
-                <a:ln w="0"/>
-                <a:solidFill>
-                  <a:schemeClr val="tx1"/>
-                </a:solidFill>
-                <a:effectLst>
-                  <a:outerShdw blurRad="38100" dist="19050" dir="2700000" algn="tl" rotWithShape="0">
-                    <a:schemeClr val="dk1">
-                      <a:alpha val="40000"/>
-                    </a:schemeClr>
-                  </a:outerShdw>
-                </a:effectLst>
-              </a:rPr>
-              <a:t>GPIO.output</a:t>
-            </a:r>
-            <a:r>
-              <a:rPr lang="en-US" sz="2000" cap="none" dirty="0" smtClean="0">
-                <a:ln w="0"/>
-                <a:solidFill>
-                  <a:schemeClr val="tx1"/>
-                </a:solidFill>
-                <a:effectLst>
-                  <a:outerShdw blurRad="38100" dist="19050" dir="2700000" algn="tl" rotWithShape="0">
-                    <a:schemeClr val="dk1">
-                      <a:alpha val="40000"/>
-                    </a:schemeClr>
-                  </a:outerShdw>
-                </a:effectLst>
-              </a:rPr>
-              <a:t>(&lt;channel&gt;,&lt;state&gt;)</a:t>
-            </a:r>
-          </a:p>
-          <a:p>
-            <a:pPr lvl="1"/>
-            <a:r>
-              <a:rPr lang="en-US" sz="1800" cap="none" dirty="0" smtClean="0">
-                <a:ln w="0"/>
-                <a:solidFill>
-                  <a:schemeClr val="tx1"/>
-                </a:solidFill>
-                <a:effectLst>
-                  <a:outerShdw blurRad="38100" dist="19050" dir="2700000" algn="tl" rotWithShape="0">
-                    <a:schemeClr val="dk1">
-                      <a:alpha val="40000"/>
-                    </a:schemeClr>
-                  </a:outerShdw>
-                </a:effectLst>
-              </a:rPr>
-              <a:t>GPIO.HIGH</a:t>
-            </a:r>
-          </a:p>
-          <a:p>
-            <a:pPr lvl="1"/>
-            <a:r>
-              <a:rPr lang="en-US" sz="1800" cap="none" dirty="0" smtClean="0">
-                <a:ln w="0"/>
-                <a:solidFill>
-                  <a:schemeClr val="tx1"/>
-                </a:solidFill>
-                <a:effectLst>
-                  <a:outerShdw blurRad="38100" dist="19050" dir="2700000" algn="tl" rotWithShape="0">
-                    <a:schemeClr val="dk1">
-                      <a:alpha val="40000"/>
-                    </a:schemeClr>
-                  </a:outerShdw>
-                </a:effectLst>
-              </a:rPr>
-              <a:t>GPIO.LOW</a:t>
-            </a:r>
-          </a:p>
-          <a:p>
-            <a:r>
-              <a:rPr lang="en-US" sz="2000" cap="none" dirty="0" err="1" smtClean="0">
-                <a:ln w="0"/>
-                <a:solidFill>
-                  <a:schemeClr val="tx1"/>
-                </a:solidFill>
-                <a:effectLst>
-                  <a:outerShdw blurRad="38100" dist="19050" dir="2700000" algn="tl" rotWithShape="0">
-                    <a:schemeClr val="dk1">
-                      <a:alpha val="40000"/>
-                    </a:schemeClr>
-                  </a:outerShdw>
-                </a:effectLst>
-              </a:rPr>
-              <a:t>GPIO.cleanup</a:t>
-            </a:r>
-            <a:r>
-              <a:rPr lang="en-US" sz="2000" cap="none" dirty="0" smtClean="0">
-                <a:ln w="0"/>
-                <a:solidFill>
-                  <a:schemeClr val="tx1"/>
-                </a:solidFill>
-                <a:effectLst>
-                  <a:outerShdw blurRad="38100" dist="19050" dir="2700000" algn="tl" rotWithShape="0">
-                    <a:schemeClr val="dk1">
-                      <a:alpha val="40000"/>
-                    </a:schemeClr>
-                  </a:outerShdw>
-                </a:effectLst>
-              </a:rPr>
-              <a:t>()</a:t>
-            </a:r>
-            <a:endParaRPr lang="en-US" sz="2000" cap="none" dirty="0">
-              <a:ln w="0"/>
-              <a:solidFill>
-                <a:schemeClr val="tx1"/>
-              </a:solidFill>
-              <a:effectLst>
-                <a:outerShdw blurRad="38100" dist="19050" dir="2700000" algn="tl" rotWithShape="0">
-                  <a:schemeClr val="dk1">
-                    <a:alpha val="40000"/>
-                  </a:schemeClr>
-                </a:outerShdw>
-              </a:effectLst>
-            </a:endParaRPr>
-          </a:p>
-        </p:txBody>
-      </p:sp>
-      <p:sp>
-        <p:nvSpPr>
-          <p:cNvPr id="5" name="Rectangle 4"/>
-          <p:cNvSpPr/>
-          <p:nvPr/>
-        </p:nvSpPr>
-        <p:spPr>
-          <a:xfrm>
-            <a:off x="787400" y="6176963"/>
-            <a:ext cx="10566400" cy="646331"/>
-          </a:xfrm>
-          <a:prstGeom prst="rect">
-            <a:avLst/>
-          </a:prstGeom>
-        </p:spPr>
-        <p:txBody>
-          <a:bodyPr wrap="square">
-            <a:spAutoFit/>
-          </a:bodyPr>
-          <a:lstStyle/>
-          <a:p>
-            <a:r>
-              <a:rPr lang="en-US" dirty="0" smtClean="0">
-                <a:hlinkClick r:id="rId2"/>
-              </a:rPr>
-              <a:t>https://www.raspberrypi.org/learning/physical-computing-with-python/</a:t>
-            </a:r>
-          </a:p>
-          <a:p>
-            <a:r>
-              <a:rPr lang="en-US" dirty="0" smtClean="0">
-                <a:hlinkClick r:id="rId2"/>
-              </a:rPr>
-              <a:t>https://sourceforge.net/p/raspberry-gpio-python/wiki/BasicUsage/</a:t>
-            </a:r>
-            <a:endParaRPr lang="en-US" dirty="0" smtClean="0"/>
-          </a:p>
-        </p:txBody>
-      </p:sp>
-    </p:spTree>
-    <p:extLst>
-      <p:ext uri="{BB962C8B-B14F-4D97-AF65-F5344CB8AC3E}">
-        <p14:creationId xmlns:p14="http://schemas.microsoft.com/office/powerpoint/2010/main" val="3462255310"/>
-      </p:ext>
-    </p:extLst>
-  </p:cSld>
-  <p:clrMapOvr>
-    <a:masterClrMapping/>
-  </p:clrMapOvr>
-</p:sld>
-</file>
-
-<file path=ppt/slides/slide11.xml><?xml version="1.0" encoding="utf-8"?>
-<p:sld xmlns:a="http://schemas.openxmlformats.org/drawingml/2006/main" xmlns:r="http://schemas.openxmlformats.org/officeDocument/2006/relationships" xmlns:p="http://schemas.openxmlformats.org/presentationml/2006/main">
-  <p:cSld>
-    <p:spTree>
-      <p:nvGrpSpPr>
-        <p:cNvPr id="1" name=""/>
-        <p:cNvGrpSpPr/>
-        <p:nvPr/>
-      </p:nvGrpSpPr>
-      <p:grpSpPr>
-        <a:xfrm>
-          <a:off x="0" y="0"/>
-          <a:ext cx="0" cy="0"/>
-          <a:chOff x="0" y="0"/>
-          <a:chExt cx="0" cy="0"/>
-        </a:xfrm>
-      </p:grpSpPr>
-      <p:sp>
-        <p:nvSpPr>
-          <p:cNvPr id="2" name="Title 1"/>
-          <p:cNvSpPr>
-            <a:spLocks noGrp="1"/>
-          </p:cNvSpPr>
-          <p:nvPr>
-            <p:ph type="title"/>
-          </p:nvPr>
-        </p:nvSpPr>
-        <p:spPr/>
-        <p:txBody>
           <a:bodyPr anchor="t"/>
           <a:lstStyle/>
           <a:p>
@@ -7548,7 +6758,7 @@
 </p:sld>
 </file>
 
-<file path=ppt/slides/slide12.xml><?xml version="1.0" encoding="utf-8"?>
+<file path=ppt/slides/slide11.xml><?xml version="1.0" encoding="utf-8"?>
 <p:sld xmlns:a="http://schemas.openxmlformats.org/drawingml/2006/main" xmlns:r="http://schemas.openxmlformats.org/officeDocument/2006/relationships" xmlns:p="http://schemas.openxmlformats.org/presentationml/2006/main">
   <p:cSld>
     <p:spTree>
@@ -7582,11 +6792,7 @@
           <a:p>
             <a:r>
               <a:rPr lang="en-US" dirty="0" smtClean="0"/>
-              <a:t>Wiring </a:t>
-            </a:r>
-            <a:r>
-              <a:rPr lang="en-US" dirty="0" smtClean="0"/>
-              <a:t>Diagram – DHT11</a:t>
+              <a:t>Wiring Diagram – DHT11</a:t>
             </a:r>
             <a:endParaRPr lang="en-US" dirty="0"/>
           </a:p>
@@ -7664,7 +6870,7 @@
 </p:sld>
 </file>
 
-<file path=ppt/slides/slide13.xml><?xml version="1.0" encoding="utf-8"?>
+<file path=ppt/slides/slide12.xml><?xml version="1.0" encoding="utf-8"?>
 <p:sld xmlns:a="http://schemas.openxmlformats.org/drawingml/2006/main" xmlns:r="http://schemas.openxmlformats.org/officeDocument/2006/relationships" xmlns:p="http://schemas.openxmlformats.org/presentationml/2006/main">
   <p:cSld>
     <p:spTree>
@@ -7734,7 +6940,6 @@
               <a:rPr lang="en-US" dirty="0" smtClean="0"/>
               <a:t>Safely switch 120vac appliances</a:t>
             </a:r>
-            <a:endParaRPr lang="en-US" dirty="0" smtClean="0"/>
           </a:p>
           <a:p>
             <a:pPr lvl="1"/>
@@ -7742,7 +6947,6 @@
               <a:rPr lang="en-US" dirty="0" smtClean="0"/>
               <a:t>No dangerous 120vac wiring required</a:t>
             </a:r>
-            <a:endParaRPr lang="en-US" dirty="0" smtClean="0"/>
           </a:p>
           <a:p>
             <a:pPr lvl="1"/>
@@ -7757,14 +6961,12 @@
               <a:rPr lang="en-US" dirty="0" smtClean="0"/>
               <a:t>Up to 15 amp</a:t>
             </a:r>
-            <a:endParaRPr lang="en-US" dirty="0" smtClean="0"/>
           </a:p>
           <a:p>
             <a:r>
               <a:rPr lang="en-US" dirty="0" smtClean="0"/>
               <a:t>Convenient, easy to use</a:t>
             </a:r>
-            <a:endParaRPr lang="en-US" dirty="0" smtClean="0"/>
           </a:p>
           <a:p>
             <a:pPr lvl="1"/>
@@ -7772,7 +6974,6 @@
               <a:rPr lang="en-US" dirty="0" smtClean="0"/>
               <a:t>Simple as an extension cord</a:t>
             </a:r>
-            <a:endParaRPr lang="en-US" dirty="0" smtClean="0"/>
           </a:p>
           <a:p>
             <a:pPr lvl="1"/>
@@ -7787,7 +6988,6 @@
               <a:rPr lang="en-US" dirty="0" smtClean="0"/>
               <a:t>LED status indicator for debugging</a:t>
             </a:r>
-            <a:endParaRPr lang="en-US" dirty="0" smtClean="0"/>
           </a:p>
         </p:txBody>
       </p:sp>
@@ -7904,7 +7104,7 @@
 </p:sld>
 </file>
 
-<file path=ppt/slides/slide14.xml><?xml version="1.0" encoding="utf-8"?>
+<file path=ppt/slides/slide13.xml><?xml version="1.0" encoding="utf-8"?>
 <p:sld xmlns:a="http://schemas.openxmlformats.org/drawingml/2006/main" xmlns:r="http://schemas.openxmlformats.org/officeDocument/2006/relationships" xmlns:p="http://schemas.openxmlformats.org/presentationml/2006/main">
   <p:cSld>
     <p:spTree>
@@ -7938,11 +7138,7 @@
           <a:p>
             <a:r>
               <a:rPr lang="en-US" dirty="0" smtClean="0"/>
-              <a:t>Wiring </a:t>
-            </a:r>
-            <a:r>
-              <a:rPr lang="en-US" dirty="0" smtClean="0"/>
-              <a:t>Diagram – PST II</a:t>
+              <a:t>Wiring Diagram – PST II</a:t>
             </a:r>
             <a:endParaRPr lang="en-US" dirty="0"/>
           </a:p>
@@ -8022,7 +7218,7 @@
 </p:sld>
 </file>
 
-<file path=ppt/slides/slide15.xml><?xml version="1.0" encoding="utf-8"?>
+<file path=ppt/slides/slide14.xml><?xml version="1.0" encoding="utf-8"?>
 <p:sld xmlns:a="http://schemas.openxmlformats.org/drawingml/2006/main" xmlns:r="http://schemas.openxmlformats.org/officeDocument/2006/relationships" xmlns:p="http://schemas.openxmlformats.org/presentationml/2006/main">
   <p:cSld>
     <p:spTree>
@@ -8107,6 +7303,485 @@
 </p:sld>
 </file>
 
+<file path=ppt/slides/slide15.xml><?xml version="1.0" encoding="utf-8"?>
+<p:sld xmlns:a="http://schemas.openxmlformats.org/drawingml/2006/main" xmlns:r="http://schemas.openxmlformats.org/officeDocument/2006/relationships" xmlns:p="http://schemas.openxmlformats.org/presentationml/2006/main">
+  <p:cSld>
+    <p:spTree>
+      <p:nvGrpSpPr>
+        <p:cNvPr id="1" name=""/>
+        <p:cNvGrpSpPr/>
+        <p:nvPr/>
+      </p:nvGrpSpPr>
+      <p:grpSpPr>
+        <a:xfrm>
+          <a:off x="0" y="0"/>
+          <a:ext cx="0" cy="0"/>
+          <a:chOff x="0" y="0"/>
+          <a:chExt cx="0" cy="0"/>
+        </a:xfrm>
+      </p:grpSpPr>
+      <p:sp>
+        <p:nvSpPr>
+          <p:cNvPr id="2" name="Title 1"/>
+          <p:cNvSpPr>
+            <a:spLocks noGrp="1"/>
+          </p:cNvSpPr>
+          <p:nvPr>
+            <p:ph type="title"/>
+          </p:nvPr>
+        </p:nvSpPr>
+        <p:spPr/>
+        <p:txBody>
+          <a:bodyPr/>
+          <a:lstStyle/>
+          <a:p>
+            <a:r>
+              <a:rPr lang="en-US" dirty="0" err="1" smtClean="0"/>
+              <a:t>Raspi</a:t>
+            </a:r>
+            <a:r>
+              <a:rPr lang="en-US" dirty="0" smtClean="0"/>
+              <a:t> GPIO</a:t>
+            </a:r>
+            <a:endParaRPr lang="en-US" dirty="0"/>
+          </a:p>
+        </p:txBody>
+      </p:sp>
+      <p:sp>
+        <p:nvSpPr>
+          <p:cNvPr id="3" name="Content Placeholder 2"/>
+          <p:cNvSpPr>
+            <a:spLocks noGrp="1"/>
+          </p:cNvSpPr>
+          <p:nvPr>
+            <p:ph sz="half" idx="1"/>
+          </p:nvPr>
+        </p:nvSpPr>
+        <p:spPr/>
+        <p:txBody>
+          <a:bodyPr>
+            <a:normAutofit/>
+          </a:bodyPr>
+          <a:lstStyle/>
+          <a:p>
+            <a:r>
+              <a:rPr lang="en-US" sz="2000" cap="none" dirty="0" smtClean="0">
+                <a:ln w="0"/>
+                <a:solidFill>
+                  <a:schemeClr val="tx1"/>
+                </a:solidFill>
+                <a:effectLst>
+                  <a:outerShdw blurRad="38100" dist="19050" dir="2700000" algn="tl" rotWithShape="0">
+                    <a:schemeClr val="dk1">
+                      <a:alpha val="40000"/>
+                    </a:schemeClr>
+                  </a:outerShdw>
+                </a:effectLst>
+              </a:rPr>
+              <a:t>import </a:t>
+            </a:r>
+            <a:r>
+              <a:rPr lang="en-US" sz="2000" cap="none" dirty="0" err="1" smtClean="0">
+                <a:ln w="0"/>
+                <a:solidFill>
+                  <a:schemeClr val="tx1"/>
+                </a:solidFill>
+                <a:effectLst>
+                  <a:outerShdw blurRad="38100" dist="19050" dir="2700000" algn="tl" rotWithShape="0">
+                    <a:schemeClr val="dk1">
+                      <a:alpha val="40000"/>
+                    </a:schemeClr>
+                  </a:outerShdw>
+                </a:effectLst>
+              </a:rPr>
+              <a:t>RPi.GPIO</a:t>
+            </a:r>
+            <a:r>
+              <a:rPr lang="en-US" sz="2000" cap="none" dirty="0" smtClean="0">
+                <a:ln w="0"/>
+                <a:solidFill>
+                  <a:schemeClr val="tx1"/>
+                </a:solidFill>
+                <a:effectLst>
+                  <a:outerShdw blurRad="38100" dist="19050" dir="2700000" algn="tl" rotWithShape="0">
+                    <a:schemeClr val="dk1">
+                      <a:alpha val="40000"/>
+                    </a:schemeClr>
+                  </a:outerShdw>
+                </a:effectLst>
+              </a:rPr>
+              <a:t> as GPIO</a:t>
+            </a:r>
+          </a:p>
+          <a:p>
+            <a:r>
+              <a:rPr lang="en-US" sz="2000" cap="none" dirty="0" err="1" smtClean="0">
+                <a:ln w="0"/>
+                <a:solidFill>
+                  <a:schemeClr val="tx1"/>
+                </a:solidFill>
+                <a:effectLst>
+                  <a:outerShdw blurRad="38100" dist="19050" dir="2700000" algn="tl" rotWithShape="0">
+                    <a:schemeClr val="dk1">
+                      <a:alpha val="40000"/>
+                    </a:schemeClr>
+                  </a:outerShdw>
+                </a:effectLst>
+              </a:rPr>
+              <a:t>GPIO.setmode</a:t>
+            </a:r>
+            <a:r>
+              <a:rPr lang="en-US" sz="2000" cap="none" dirty="0" smtClean="0">
+                <a:ln w="0"/>
+                <a:solidFill>
+                  <a:schemeClr val="tx1"/>
+                </a:solidFill>
+                <a:effectLst>
+                  <a:outerShdw blurRad="38100" dist="19050" dir="2700000" algn="tl" rotWithShape="0">
+                    <a:schemeClr val="dk1">
+                      <a:alpha val="40000"/>
+                    </a:schemeClr>
+                  </a:outerShdw>
+                </a:effectLst>
+              </a:rPr>
+              <a:t>(&lt;mode&gt;)</a:t>
+            </a:r>
+          </a:p>
+          <a:p>
+            <a:pPr lvl="1"/>
+            <a:r>
+              <a:rPr lang="en-US" sz="1800" cap="none" dirty="0" smtClean="0">
+                <a:ln w="0"/>
+                <a:solidFill>
+                  <a:schemeClr val="tx1"/>
+                </a:solidFill>
+                <a:effectLst>
+                  <a:outerShdw blurRad="38100" dist="19050" dir="2700000" algn="tl" rotWithShape="0">
+                    <a:schemeClr val="dk1">
+                      <a:alpha val="40000"/>
+                    </a:schemeClr>
+                  </a:outerShdw>
+                </a:effectLst>
+              </a:rPr>
+              <a:t>GPIO.BOARD</a:t>
+            </a:r>
+          </a:p>
+          <a:p>
+            <a:pPr lvl="1"/>
+            <a:r>
+              <a:rPr lang="en-US" sz="1800" cap="none" dirty="0" smtClean="0">
+                <a:ln w="0"/>
+                <a:solidFill>
+                  <a:schemeClr val="tx1"/>
+                </a:solidFill>
+                <a:effectLst>
+                  <a:outerShdw blurRad="38100" dist="19050" dir="2700000" algn="tl" rotWithShape="0">
+                    <a:schemeClr val="dk1">
+                      <a:alpha val="40000"/>
+                    </a:schemeClr>
+                  </a:outerShdw>
+                </a:effectLst>
+              </a:rPr>
+              <a:t>GPIO.BCM</a:t>
+            </a:r>
+          </a:p>
+          <a:p>
+            <a:r>
+              <a:rPr lang="en-US" sz="2000" cap="none" dirty="0" err="1" smtClean="0">
+                <a:ln w="0"/>
+                <a:solidFill>
+                  <a:schemeClr val="tx1"/>
+                </a:solidFill>
+                <a:effectLst>
+                  <a:outerShdw blurRad="38100" dist="19050" dir="2700000" algn="tl" rotWithShape="0">
+                    <a:schemeClr val="dk1">
+                      <a:alpha val="40000"/>
+                    </a:schemeClr>
+                  </a:outerShdw>
+                </a:effectLst>
+              </a:rPr>
+              <a:t>GPIO.setup</a:t>
+            </a:r>
+            <a:r>
+              <a:rPr lang="en-US" sz="2000" cap="none" dirty="0" smtClean="0">
+                <a:ln w="0"/>
+                <a:solidFill>
+                  <a:schemeClr val="tx1"/>
+                </a:solidFill>
+                <a:effectLst>
+                  <a:outerShdw blurRad="38100" dist="19050" dir="2700000" algn="tl" rotWithShape="0">
+                    <a:schemeClr val="dk1">
+                      <a:alpha val="40000"/>
+                    </a:schemeClr>
+                  </a:outerShdw>
+                </a:effectLst>
+              </a:rPr>
+              <a:t>(&lt;channel&gt;, &lt;in/out&gt;)</a:t>
+            </a:r>
+          </a:p>
+          <a:p>
+            <a:pPr lvl="1"/>
+            <a:r>
+              <a:rPr lang="en-US" sz="1800" cap="none" dirty="0" smtClean="0">
+                <a:ln w="0"/>
+                <a:solidFill>
+                  <a:schemeClr val="tx1"/>
+                </a:solidFill>
+                <a:effectLst>
+                  <a:outerShdw blurRad="38100" dist="19050" dir="2700000" algn="tl" rotWithShape="0">
+                    <a:schemeClr val="dk1">
+                      <a:alpha val="40000"/>
+                    </a:schemeClr>
+                  </a:outerShdw>
+                </a:effectLst>
+              </a:rPr>
+              <a:t>GPIO.OUT</a:t>
+            </a:r>
+          </a:p>
+          <a:p>
+            <a:pPr lvl="1"/>
+            <a:r>
+              <a:rPr lang="en-US" sz="1800" cap="none" dirty="0" smtClean="0">
+                <a:ln w="0"/>
+                <a:solidFill>
+                  <a:schemeClr val="tx1"/>
+                </a:solidFill>
+                <a:effectLst>
+                  <a:outerShdw blurRad="38100" dist="19050" dir="2700000" algn="tl" rotWithShape="0">
+                    <a:schemeClr val="dk1">
+                      <a:alpha val="40000"/>
+                    </a:schemeClr>
+                  </a:outerShdw>
+                </a:effectLst>
+              </a:rPr>
+              <a:t>GPIO.IN</a:t>
+            </a:r>
+          </a:p>
+        </p:txBody>
+      </p:sp>
+      <p:sp>
+        <p:nvSpPr>
+          <p:cNvPr id="4" name="Content Placeholder 3"/>
+          <p:cNvSpPr>
+            <a:spLocks noGrp="1"/>
+          </p:cNvSpPr>
+          <p:nvPr>
+            <p:ph sz="half" idx="2"/>
+          </p:nvPr>
+        </p:nvSpPr>
+        <p:spPr/>
+        <p:txBody>
+          <a:bodyPr>
+            <a:normAutofit/>
+          </a:bodyPr>
+          <a:lstStyle/>
+          <a:p>
+            <a:r>
+              <a:rPr lang="en-US" sz="2000" cap="none" dirty="0" err="1" smtClean="0">
+                <a:ln w="0"/>
+                <a:solidFill>
+                  <a:schemeClr val="tx1"/>
+                </a:solidFill>
+                <a:effectLst>
+                  <a:outerShdw blurRad="38100" dist="19050" dir="2700000" algn="tl" rotWithShape="0">
+                    <a:schemeClr val="dk1">
+                      <a:alpha val="40000"/>
+                    </a:schemeClr>
+                  </a:outerShdw>
+                </a:effectLst>
+              </a:rPr>
+              <a:t>GPIO.input</a:t>
+            </a:r>
+            <a:r>
+              <a:rPr lang="en-US" sz="2000" cap="none" dirty="0" smtClean="0">
+                <a:ln w="0"/>
+                <a:solidFill>
+                  <a:schemeClr val="tx1"/>
+                </a:solidFill>
+                <a:effectLst>
+                  <a:outerShdw blurRad="38100" dist="19050" dir="2700000" algn="tl" rotWithShape="0">
+                    <a:schemeClr val="dk1">
+                      <a:alpha val="40000"/>
+                    </a:schemeClr>
+                  </a:outerShdw>
+                </a:effectLst>
+              </a:rPr>
+              <a:t>(&lt;channel&gt;)</a:t>
+            </a:r>
+          </a:p>
+          <a:p>
+            <a:r>
+              <a:rPr lang="en-US" sz="2000" cap="none" dirty="0" err="1" smtClean="0">
+                <a:ln w="0"/>
+                <a:solidFill>
+                  <a:schemeClr val="tx1"/>
+                </a:solidFill>
+                <a:effectLst>
+                  <a:outerShdw blurRad="38100" dist="19050" dir="2700000" algn="tl" rotWithShape="0">
+                    <a:schemeClr val="dk1">
+                      <a:alpha val="40000"/>
+                    </a:schemeClr>
+                  </a:outerShdw>
+                </a:effectLst>
+              </a:rPr>
+              <a:t>GPIO.output</a:t>
+            </a:r>
+            <a:r>
+              <a:rPr lang="en-US" sz="2000" cap="none" dirty="0" smtClean="0">
+                <a:ln w="0"/>
+                <a:solidFill>
+                  <a:schemeClr val="tx1"/>
+                </a:solidFill>
+                <a:effectLst>
+                  <a:outerShdw blurRad="38100" dist="19050" dir="2700000" algn="tl" rotWithShape="0">
+                    <a:schemeClr val="dk1">
+                      <a:alpha val="40000"/>
+                    </a:schemeClr>
+                  </a:outerShdw>
+                </a:effectLst>
+              </a:rPr>
+              <a:t>(&lt;channel&gt;,&lt;state&gt;)</a:t>
+            </a:r>
+          </a:p>
+          <a:p>
+            <a:pPr lvl="1"/>
+            <a:r>
+              <a:rPr lang="en-US" sz="1800" cap="none" dirty="0" smtClean="0">
+                <a:ln w="0"/>
+                <a:solidFill>
+                  <a:schemeClr val="tx1"/>
+                </a:solidFill>
+                <a:effectLst>
+                  <a:outerShdw blurRad="38100" dist="19050" dir="2700000" algn="tl" rotWithShape="0">
+                    <a:schemeClr val="dk1">
+                      <a:alpha val="40000"/>
+                    </a:schemeClr>
+                  </a:outerShdw>
+                </a:effectLst>
+              </a:rPr>
+              <a:t>GPIO.HIGH</a:t>
+            </a:r>
+          </a:p>
+          <a:p>
+            <a:pPr lvl="1"/>
+            <a:r>
+              <a:rPr lang="en-US" sz="1800" cap="none" dirty="0" smtClean="0">
+                <a:ln w="0"/>
+                <a:solidFill>
+                  <a:schemeClr val="tx1"/>
+                </a:solidFill>
+                <a:effectLst>
+                  <a:outerShdw blurRad="38100" dist="19050" dir="2700000" algn="tl" rotWithShape="0">
+                    <a:schemeClr val="dk1">
+                      <a:alpha val="40000"/>
+                    </a:schemeClr>
+                  </a:outerShdw>
+                </a:effectLst>
+              </a:rPr>
+              <a:t>GPIO.LOW</a:t>
+            </a:r>
+          </a:p>
+          <a:p>
+            <a:r>
+              <a:rPr lang="en-US" sz="2000" cap="none" dirty="0" err="1" smtClean="0">
+                <a:ln w="0"/>
+                <a:solidFill>
+                  <a:schemeClr val="tx1"/>
+                </a:solidFill>
+                <a:effectLst>
+                  <a:outerShdw blurRad="38100" dist="19050" dir="2700000" algn="tl" rotWithShape="0">
+                    <a:schemeClr val="dk1">
+                      <a:alpha val="40000"/>
+                    </a:schemeClr>
+                  </a:outerShdw>
+                </a:effectLst>
+              </a:rPr>
+              <a:t>GPIO.cleanup</a:t>
+            </a:r>
+            <a:r>
+              <a:rPr lang="en-US" sz="2000" cap="none" dirty="0" smtClean="0">
+                <a:ln w="0"/>
+                <a:solidFill>
+                  <a:schemeClr val="tx1"/>
+                </a:solidFill>
+                <a:effectLst>
+                  <a:outerShdw blurRad="38100" dist="19050" dir="2700000" algn="tl" rotWithShape="0">
+                    <a:schemeClr val="dk1">
+                      <a:alpha val="40000"/>
+                    </a:schemeClr>
+                  </a:outerShdw>
+                </a:effectLst>
+              </a:rPr>
+              <a:t>()</a:t>
+            </a:r>
+            <a:endParaRPr lang="en-US" sz="2000" cap="none" dirty="0">
+              <a:ln w="0"/>
+              <a:solidFill>
+                <a:schemeClr val="tx1"/>
+              </a:solidFill>
+              <a:effectLst>
+                <a:outerShdw blurRad="38100" dist="19050" dir="2700000" algn="tl" rotWithShape="0">
+                  <a:schemeClr val="dk1">
+                    <a:alpha val="40000"/>
+                  </a:schemeClr>
+                </a:outerShdw>
+              </a:effectLst>
+            </a:endParaRPr>
+          </a:p>
+        </p:txBody>
+      </p:sp>
+      <p:sp>
+        <p:nvSpPr>
+          <p:cNvPr id="5" name="Rectangle 4"/>
+          <p:cNvSpPr/>
+          <p:nvPr/>
+        </p:nvSpPr>
+        <p:spPr>
+          <a:xfrm>
+            <a:off x="787400" y="6176963"/>
+            <a:ext cx="10566400" cy="646331"/>
+          </a:xfrm>
+          <a:prstGeom prst="rect">
+            <a:avLst/>
+          </a:prstGeom>
+        </p:spPr>
+        <p:txBody>
+          <a:bodyPr wrap="square">
+            <a:spAutoFit/>
+          </a:bodyPr>
+          <a:lstStyle/>
+          <a:p>
+            <a:r>
+              <a:rPr lang="en-US" dirty="0" smtClean="0">
+                <a:hlinkClick r:id="rId2"/>
+              </a:rPr>
+              <a:t>https://www.raspberrypi.org/learning/physical-computing-with-python/</a:t>
+            </a:r>
+          </a:p>
+          <a:p>
+            <a:r>
+              <a:rPr lang="en-US" dirty="0" smtClean="0">
+                <a:hlinkClick r:id="rId2"/>
+              </a:rPr>
+              <a:t>https://sourceforge.net/p/raspberry-gpio-python/wiki/BasicUsage/</a:t>
+            </a:r>
+            <a:endParaRPr lang="en-US" dirty="0" smtClean="0"/>
+          </a:p>
+        </p:txBody>
+      </p:sp>
+    </p:spTree>
+    <p:extLst>
+      <p:ext uri="{BB962C8B-B14F-4D97-AF65-F5344CB8AC3E}">
+        <p14:creationId xmlns:p14="http://schemas.microsoft.com/office/powerpoint/2010/main" val="3462255310"/>
+      </p:ext>
+    </p:extLst>
+  </p:cSld>
+  <p:clrMapOvr>
+    <a:masterClrMapping/>
+  </p:clrMapOvr>
+</p:sld>
+</file>
+
 <file path=ppt/slides/slide16.xml><?xml version="1.0" encoding="utf-8"?>
 <p:sld xmlns:a="http://schemas.openxmlformats.org/drawingml/2006/main" xmlns:r="http://schemas.openxmlformats.org/officeDocument/2006/relationships" xmlns:p="http://schemas.openxmlformats.org/presentationml/2006/main">
   <p:cSld>
@@ -8911,7 +8586,11 @@
           <a:p>
             <a:r>
               <a:rPr lang="en-US" dirty="0" smtClean="0"/>
-              <a:t>Getting Started</a:t>
+              <a:t>Get </a:t>
+            </a:r>
+            <a:r>
+              <a:rPr lang="en-US" dirty="0" smtClean="0"/>
+              <a:t>Started</a:t>
             </a:r>
             <a:endParaRPr lang="en-US" dirty="0"/>
           </a:p>
@@ -8965,11 +8644,7 @@
           <a:p>
             <a:r>
               <a:rPr lang="en-US" dirty="0" smtClean="0"/>
-              <a:t>Get deals with kits and a bit of </a:t>
-            </a:r>
-            <a:r>
-              <a:rPr lang="en-US" dirty="0" smtClean="0"/>
-              <a:t>research</a:t>
+              <a:t>Get deals with kits and a bit of research</a:t>
             </a:r>
           </a:p>
           <a:p>
@@ -9175,7 +8850,7 @@
           <p:nvPr/>
         </p:nvPicPr>
         <p:blipFill>
-          <a:blip r:embed="rId2">
+          <a:blip r:embed="rId3">
             <a:extLst>
               <a:ext uri="{28A0092B-C50C-407E-A947-70E740481C1C}">
                 <a14:useLocalDpi xmlns:a14="http://schemas.microsoft.com/office/drawing/2010/main" val="0"/>
@@ -9268,7 +8943,7 @@
       </p:pic>
       <p:pic>
         <p:nvPicPr>
-          <p:cNvPr id="6" name="Picture 5"/>
+          <p:cNvPr id="9" name="Picture 8"/>
           <p:cNvPicPr>
             <a:picLocks noChangeAspect="1"/>
           </p:cNvPicPr>
@@ -9276,60 +8951,6 @@
         </p:nvPicPr>
         <p:blipFill>
           <a:blip r:embed="rId4"/>
-          <a:stretch>
-            <a:fillRect/>
-          </a:stretch>
-        </p:blipFill>
-        <p:spPr>
-          <a:xfrm>
-            <a:off x="5038480" y="1324196"/>
-            <a:ext cx="6962775" cy="4210050"/>
-          </a:xfrm>
-          <a:prstGeom prst="snip2DiagRect">
-            <a:avLst/>
-          </a:prstGeom>
-          <a:solidFill>
-            <a:srgbClr val="FFFFFF">
-              <a:shade val="85000"/>
-            </a:srgbClr>
-          </a:solidFill>
-          <a:ln w="88900" cap="sq">
-            <a:solidFill>
-              <a:srgbClr val="FFFFFF"/>
-            </a:solidFill>
-            <a:miter lim="800000"/>
-          </a:ln>
-          <a:effectLst>
-            <a:outerShdw blurRad="88900" algn="tl" rotWithShape="0">
-              <a:srgbClr val="000000">
-                <a:alpha val="45000"/>
-              </a:srgbClr>
-            </a:outerShdw>
-          </a:effectLst>
-          <a:scene3d>
-            <a:camera prst="orthographicFront"/>
-            <a:lightRig rig="twoPt" dir="t">
-              <a:rot lat="0" lon="0" rev="7200000"/>
-            </a:lightRig>
-          </a:scene3d>
-          <a:sp3d>
-            <a:bevelT w="25400" h="19050"/>
-            <a:contourClr>
-              <a:srgbClr val="FFFFFF"/>
-            </a:contourClr>
-          </a:sp3d>
-        </p:spPr>
-      </p:pic>
-      <p:pic>
-        <p:nvPicPr>
-          <p:cNvPr id="9" name="Picture 8"/>
-          <p:cNvPicPr>
-            <a:picLocks noChangeAspect="1"/>
-          </p:cNvPicPr>
-          <p:nvPr/>
-        </p:nvPicPr>
-        <p:blipFill>
-          <a:blip r:embed="rId5"/>
           <a:stretch>
             <a:fillRect/>
           </a:stretch>
@@ -10764,13 +10385,13 @@
           <a:p>
             <a:r>
               <a:rPr lang="en-US" dirty="0">
-                <a:hlinkClick r:id="rId6"/>
+                <a:hlinkClick r:id="rId5"/>
               </a:rPr>
               <a:t>https://</a:t>
             </a:r>
             <a:r>
               <a:rPr lang="en-US" dirty="0" smtClean="0">
-                <a:hlinkClick r:id="rId6"/>
+                <a:hlinkClick r:id="rId5"/>
               </a:rPr>
               <a:t>en.wikipedia.org/wiki/Internet_of_Things</a:t>
             </a:r>
@@ -10782,6 +10403,60 @@
           </a:p>
         </p:txBody>
       </p:sp>
+      <p:pic>
+        <p:nvPicPr>
+          <p:cNvPr id="2" name="Picture 1"/>
+          <p:cNvPicPr>
+            <a:picLocks noChangeAspect="1"/>
+          </p:cNvPicPr>
+          <p:nvPr/>
+        </p:nvPicPr>
+        <p:blipFill>
+          <a:blip r:embed="rId6"/>
+          <a:stretch>
+            <a:fillRect/>
+          </a:stretch>
+        </p:blipFill>
+        <p:spPr>
+          <a:xfrm>
+            <a:off x="4706586" y="1291146"/>
+            <a:ext cx="7089067" cy="4305402"/>
+          </a:xfrm>
+          <a:prstGeom prst="snip2DiagRect">
+            <a:avLst/>
+          </a:prstGeom>
+          <a:solidFill>
+            <a:srgbClr val="FFFFFF">
+              <a:shade val="85000"/>
+            </a:srgbClr>
+          </a:solidFill>
+          <a:ln w="88900" cap="sq">
+            <a:solidFill>
+              <a:srgbClr val="FFFFFF"/>
+            </a:solidFill>
+            <a:miter lim="800000"/>
+          </a:ln>
+          <a:effectLst>
+            <a:outerShdw blurRad="88900" algn="tl" rotWithShape="0">
+              <a:srgbClr val="000000">
+                <a:alpha val="45000"/>
+              </a:srgbClr>
+            </a:outerShdw>
+          </a:effectLst>
+          <a:scene3d>
+            <a:camera prst="orthographicFront"/>
+            <a:lightRig rig="twoPt" dir="t">
+              <a:rot lat="0" lon="0" rev="7200000"/>
+            </a:lightRig>
+          </a:scene3d>
+          <a:sp3d>
+            <a:bevelT w="25400" h="19050"/>
+            <a:contourClr>
+              <a:srgbClr val="FFFFFF"/>
+            </a:contourClr>
+          </a:sp3d>
+        </p:spPr>
+      </p:pic>
     </p:spTree>
     <p:extLst>
       <p:ext uri="{BB962C8B-B14F-4D97-AF65-F5344CB8AC3E}">
@@ -10969,13 +10644,13 @@
           <a:p>
             <a:r>
               <a:rPr lang="en-US" dirty="0">
-                <a:hlinkClick r:id="rId2"/>
+                <a:hlinkClick r:id="rId3"/>
               </a:rPr>
               <a:t>https://www.raspberrypi.org/products/raspberry-pi-2-model-b</a:t>
             </a:r>
             <a:r>
               <a:rPr lang="en-US" dirty="0" smtClean="0">
-                <a:hlinkClick r:id="rId2"/>
+                <a:hlinkClick r:id="rId3"/>
               </a:rPr>
               <a:t>/</a:t>
             </a:r>
@@ -10996,7 +10671,7 @@
           <p:nvPr/>
         </p:nvPicPr>
         <p:blipFill>
-          <a:blip r:embed="rId3" cstate="print">
+          <a:blip r:embed="rId4" cstate="print">
             <a:extLst>
               <a:ext uri="{28A0092B-C50C-407E-A947-70E740481C1C}">
                 <a14:useLocalDpi xmlns:a14="http://schemas.microsoft.com/office/drawing/2010/main" val="0"/>
@@ -11037,7 +10712,7 @@
           <p:nvPr/>
         </p:nvPicPr>
         <p:blipFill>
-          <a:blip r:embed="rId4">
+          <a:blip r:embed="rId5">
             <a:extLst>
               <a:ext uri="{28A0092B-C50C-407E-A947-70E740481C1C}">
                 <a14:useLocalDpi xmlns:a14="http://schemas.microsoft.com/office/drawing/2010/main" val="0"/>
@@ -11175,6 +10850,163 @@
 </file>
 
 <file path=ppt/slides/slide5.xml><?xml version="1.0" encoding="utf-8"?>
+<p:sld xmlns:a="http://schemas.openxmlformats.org/drawingml/2006/main" xmlns:r="http://schemas.openxmlformats.org/officeDocument/2006/relationships" xmlns:p="http://schemas.openxmlformats.org/presentationml/2006/main">
+  <p:cSld>
+    <p:spTree>
+      <p:nvGrpSpPr>
+        <p:cNvPr id="1" name=""/>
+        <p:cNvGrpSpPr/>
+        <p:nvPr/>
+      </p:nvGrpSpPr>
+      <p:grpSpPr>
+        <a:xfrm>
+          <a:off x="0" y="0"/>
+          <a:ext cx="0" cy="0"/>
+          <a:chOff x="0" y="0"/>
+          <a:chExt cx="0" cy="0"/>
+        </a:xfrm>
+      </p:grpSpPr>
+      <p:sp>
+        <p:nvSpPr>
+          <p:cNvPr id="2" name="Title 1"/>
+          <p:cNvSpPr>
+            <a:spLocks noGrp="1"/>
+          </p:cNvSpPr>
+          <p:nvPr>
+            <p:ph type="title"/>
+          </p:nvPr>
+        </p:nvSpPr>
+        <p:spPr/>
+        <p:txBody>
+          <a:bodyPr/>
+          <a:lstStyle/>
+          <a:p>
+            <a:r>
+              <a:rPr lang="en-US" dirty="0" smtClean="0"/>
+              <a:t>Design Principals</a:t>
+            </a:r>
+            <a:endParaRPr lang="en-US" dirty="0"/>
+          </a:p>
+        </p:txBody>
+      </p:sp>
+      <p:sp>
+        <p:nvSpPr>
+          <p:cNvPr id="3" name="Content Placeholder 2"/>
+          <p:cNvSpPr>
+            <a:spLocks noGrp="1"/>
+          </p:cNvSpPr>
+          <p:nvPr>
+            <p:ph idx="1"/>
+          </p:nvPr>
+        </p:nvSpPr>
+        <p:spPr>
+          <a:xfrm>
+            <a:off x="1141413" y="2666999"/>
+            <a:ext cx="5005387" cy="3124201"/>
+          </a:xfrm>
+        </p:spPr>
+        <p:txBody>
+          <a:bodyPr>
+            <a:normAutofit lnSpcReduction="10000"/>
+          </a:bodyPr>
+          <a:lstStyle/>
+          <a:p>
+            <a:r>
+              <a:rPr lang="en-US" dirty="0" smtClean="0"/>
+              <a:t>Be lean</a:t>
+            </a:r>
+          </a:p>
+          <a:p>
+            <a:pPr lvl="1"/>
+            <a:r>
+              <a:rPr lang="en-US" dirty="0" smtClean="0"/>
+              <a:t>Keep it simple</a:t>
+            </a:r>
+          </a:p>
+          <a:p>
+            <a:pPr lvl="1"/>
+            <a:r>
+              <a:rPr lang="en-US" dirty="0" smtClean="0"/>
+              <a:t>Create value</a:t>
+            </a:r>
+          </a:p>
+          <a:p>
+            <a:pPr lvl="1"/>
+            <a:r>
+              <a:rPr lang="en-US" dirty="0" smtClean="0"/>
+              <a:t>If it already exists, use it</a:t>
+            </a:r>
+          </a:p>
+          <a:p>
+            <a:pPr lvl="1"/>
+            <a:r>
+              <a:rPr lang="en-US" dirty="0" smtClean="0"/>
+              <a:t>Make it work, then improve later if needed</a:t>
+            </a:r>
+          </a:p>
+          <a:p>
+            <a:r>
+              <a:rPr lang="en-US" dirty="0" smtClean="0"/>
+              <a:t>YAGNI</a:t>
+            </a:r>
+          </a:p>
+          <a:p>
+            <a:r>
+              <a:rPr lang="en-US" dirty="0" smtClean="0"/>
+              <a:t>Learn</a:t>
+            </a:r>
+          </a:p>
+          <a:p>
+            <a:pPr lvl="1"/>
+            <a:endParaRPr lang="en-US" dirty="0"/>
+          </a:p>
+        </p:txBody>
+      </p:sp>
+      <p:pic>
+        <p:nvPicPr>
+          <p:cNvPr id="5" name="Picture 4"/>
+          <p:cNvPicPr>
+            <a:picLocks noChangeAspect="1"/>
+          </p:cNvPicPr>
+          <p:nvPr/>
+        </p:nvPicPr>
+        <p:blipFill>
+          <a:blip r:embed="rId2"/>
+          <a:stretch>
+            <a:fillRect/>
+          </a:stretch>
+        </p:blipFill>
+        <p:spPr>
+          <a:xfrm>
+            <a:off x="5739079" y="1971040"/>
+            <a:ext cx="6095412" cy="3985260"/>
+          </a:xfrm>
+          <a:prstGeom prst="rect">
+            <a:avLst/>
+          </a:prstGeom>
+        </p:spPr>
+      </p:pic>
+    </p:spTree>
+    <p:extLst>
+      <p:ext uri="{BB962C8B-B14F-4D97-AF65-F5344CB8AC3E}">
+        <p14:creationId xmlns:p14="http://schemas.microsoft.com/office/powerpoint/2010/main" val="1696978067"/>
+      </p:ext>
+    </p:extLst>
+  </p:cSld>
+  <p:clrMapOvr>
+    <a:masterClrMapping/>
+  </p:clrMapOvr>
+  <p:timing>
+    <p:tnLst>
+      <p:par>
+        <p:cTn id="1" dur="indefinite" restart="never" nodeType="tmRoot"/>
+      </p:par>
+    </p:tnLst>
+  </p:timing>
+</p:sld>
+</file>
+
+<file path=ppt/slides/slide6.xml><?xml version="1.0" encoding="utf-8"?>
 <p:sld xmlns:a="http://schemas.openxmlformats.org/drawingml/2006/main" xmlns:r="http://schemas.openxmlformats.org/officeDocument/2006/relationships" xmlns:p="http://schemas.openxmlformats.org/presentationml/2006/main">
   <p:cSld>
     <p:spTree>
@@ -11708,163 +11540,6 @@
 </p:sld>
 </file>
 
-<file path=ppt/slides/slide6.xml><?xml version="1.0" encoding="utf-8"?>
-<p:sld xmlns:a="http://schemas.openxmlformats.org/drawingml/2006/main" xmlns:r="http://schemas.openxmlformats.org/officeDocument/2006/relationships" xmlns:p="http://schemas.openxmlformats.org/presentationml/2006/main">
-  <p:cSld>
-    <p:spTree>
-      <p:nvGrpSpPr>
-        <p:cNvPr id="1" name=""/>
-        <p:cNvGrpSpPr/>
-        <p:nvPr/>
-      </p:nvGrpSpPr>
-      <p:grpSpPr>
-        <a:xfrm>
-          <a:off x="0" y="0"/>
-          <a:ext cx="0" cy="0"/>
-          <a:chOff x="0" y="0"/>
-          <a:chExt cx="0" cy="0"/>
-        </a:xfrm>
-      </p:grpSpPr>
-      <p:sp>
-        <p:nvSpPr>
-          <p:cNvPr id="2" name="Title 1"/>
-          <p:cNvSpPr>
-            <a:spLocks noGrp="1"/>
-          </p:cNvSpPr>
-          <p:nvPr>
-            <p:ph type="title"/>
-          </p:nvPr>
-        </p:nvSpPr>
-        <p:spPr/>
-        <p:txBody>
-          <a:bodyPr/>
-          <a:lstStyle/>
-          <a:p>
-            <a:r>
-              <a:rPr lang="en-US" dirty="0" smtClean="0"/>
-              <a:t>Design Principals</a:t>
-            </a:r>
-            <a:endParaRPr lang="en-US" dirty="0"/>
-          </a:p>
-        </p:txBody>
-      </p:sp>
-      <p:sp>
-        <p:nvSpPr>
-          <p:cNvPr id="3" name="Content Placeholder 2"/>
-          <p:cNvSpPr>
-            <a:spLocks noGrp="1"/>
-          </p:cNvSpPr>
-          <p:nvPr>
-            <p:ph idx="1"/>
-          </p:nvPr>
-        </p:nvSpPr>
-        <p:spPr>
-          <a:xfrm>
-            <a:off x="1141413" y="2666999"/>
-            <a:ext cx="5005387" cy="3124201"/>
-          </a:xfrm>
-        </p:spPr>
-        <p:txBody>
-          <a:bodyPr>
-            <a:normAutofit lnSpcReduction="10000"/>
-          </a:bodyPr>
-          <a:lstStyle/>
-          <a:p>
-            <a:r>
-              <a:rPr lang="en-US" dirty="0" smtClean="0"/>
-              <a:t>Be lean</a:t>
-            </a:r>
-          </a:p>
-          <a:p>
-            <a:pPr lvl="1"/>
-            <a:r>
-              <a:rPr lang="en-US" dirty="0" smtClean="0"/>
-              <a:t>Keep it simple</a:t>
-            </a:r>
-          </a:p>
-          <a:p>
-            <a:pPr lvl="1"/>
-            <a:r>
-              <a:rPr lang="en-US" dirty="0" smtClean="0"/>
-              <a:t>Create value</a:t>
-            </a:r>
-          </a:p>
-          <a:p>
-            <a:pPr lvl="1"/>
-            <a:r>
-              <a:rPr lang="en-US" dirty="0" smtClean="0"/>
-              <a:t>If it already exists, use it</a:t>
-            </a:r>
-          </a:p>
-          <a:p>
-            <a:pPr lvl="1"/>
-            <a:r>
-              <a:rPr lang="en-US" dirty="0" smtClean="0"/>
-              <a:t>Make it work, then improve later if needed</a:t>
-            </a:r>
-          </a:p>
-          <a:p>
-            <a:r>
-              <a:rPr lang="en-US" dirty="0" smtClean="0"/>
-              <a:t>YAGNI</a:t>
-            </a:r>
-          </a:p>
-          <a:p>
-            <a:r>
-              <a:rPr lang="en-US" dirty="0" smtClean="0"/>
-              <a:t>Learn</a:t>
-            </a:r>
-          </a:p>
-          <a:p>
-            <a:pPr lvl="1"/>
-            <a:endParaRPr lang="en-US" dirty="0"/>
-          </a:p>
-        </p:txBody>
-      </p:sp>
-      <p:pic>
-        <p:nvPicPr>
-          <p:cNvPr id="5" name="Picture 4"/>
-          <p:cNvPicPr>
-            <a:picLocks noChangeAspect="1"/>
-          </p:cNvPicPr>
-          <p:nvPr/>
-        </p:nvPicPr>
-        <p:blipFill>
-          <a:blip r:embed="rId2"/>
-          <a:stretch>
-            <a:fillRect/>
-          </a:stretch>
-        </p:blipFill>
-        <p:spPr>
-          <a:xfrm>
-            <a:off x="5739079" y="1971040"/>
-            <a:ext cx="6095412" cy="3985260"/>
-          </a:xfrm>
-          <a:prstGeom prst="rect">
-            <a:avLst/>
-          </a:prstGeom>
-        </p:spPr>
-      </p:pic>
-    </p:spTree>
-    <p:extLst>
-      <p:ext uri="{BB962C8B-B14F-4D97-AF65-F5344CB8AC3E}">
-        <p14:creationId xmlns:p14="http://schemas.microsoft.com/office/powerpoint/2010/main" val="1696978067"/>
-      </p:ext>
-    </p:extLst>
-  </p:cSld>
-  <p:clrMapOvr>
-    <a:masterClrMapping/>
-  </p:clrMapOvr>
-  <p:timing>
-    <p:tnLst>
-      <p:par>
-        <p:cTn id="1" dur="indefinite" restart="never" nodeType="tmRoot"/>
-      </p:par>
-    </p:tnLst>
-  </p:timing>
-</p:sld>
-</file>
-
 <file path=ppt/slides/slide7.xml><?xml version="1.0" encoding="utf-8"?>
 <p:sld xmlns:a="http://schemas.openxmlformats.org/drawingml/2006/main" xmlns:r="http://schemas.openxmlformats.org/officeDocument/2006/relationships" xmlns:p="http://schemas.openxmlformats.org/presentationml/2006/main">
   <p:cSld>
@@ -12357,6 +12032,13 @@
   <p:clrMapOvr>
     <a:masterClrMapping/>
   </p:clrMapOvr>
+  <p:timing>
+    <p:tnLst>
+      <p:par>
+        <p:cTn id="1" dur="indefinite" restart="never" nodeType="tmRoot"/>
+      </p:par>
+    </p:tnLst>
+  </p:timing>
 </p:sld>
 </file>
 
@@ -12530,6 +12212,13 @@
   <p:clrMapOvr>
     <a:masterClrMapping/>
   </p:clrMapOvr>
+  <p:timing>
+    <p:tnLst>
+      <p:par>
+        <p:cTn id="1" dur="indefinite" restart="never" nodeType="tmRoot"/>
+      </p:par>
+    </p:tnLst>
+  </p:timing>
 </p:sld>
 </file>
 

</xml_diff>